<commit_message>
Updated Bot Framework Tactics presentation.
</commit_message>
<xml_diff>
--- a/Presentations/BotFrameworkTactics.pptx
+++ b/Presentations/BotFrameworkTactics.pptx
@@ -5,20 +5,21 @@
     <p:sldMasterId id="2147483870" r:id="rId1"/>
   </p:sldMasterIdLst>
   <p:notesMasterIdLst>
-    <p:notesMasterId r:id="rId13"/>
+    <p:notesMasterId r:id="rId14"/>
   </p:notesMasterIdLst>
   <p:sldIdLst>
     <p:sldId id="256" r:id="rId2"/>
     <p:sldId id="257" r:id="rId3"/>
     <p:sldId id="258" r:id="rId4"/>
-    <p:sldId id="259" r:id="rId5"/>
-    <p:sldId id="269" r:id="rId6"/>
-    <p:sldId id="266" r:id="rId7"/>
-    <p:sldId id="262" r:id="rId8"/>
-    <p:sldId id="270" r:id="rId9"/>
-    <p:sldId id="263" r:id="rId10"/>
-    <p:sldId id="267" r:id="rId11"/>
-    <p:sldId id="268" r:id="rId12"/>
+    <p:sldId id="272" r:id="rId5"/>
+    <p:sldId id="259" r:id="rId6"/>
+    <p:sldId id="269" r:id="rId7"/>
+    <p:sldId id="266" r:id="rId8"/>
+    <p:sldId id="262" r:id="rId9"/>
+    <p:sldId id="270" r:id="rId10"/>
+    <p:sldId id="263" r:id="rId11"/>
+    <p:sldId id="267" r:id="rId12"/>
+    <p:sldId id="268" r:id="rId13"/>
   </p:sldIdLst>
   <p:sldSz cx="12192000" cy="6858000"/>
   <p:notesSz cx="6858000" cy="9144000"/>
@@ -2208,7 +2209,7 @@
           <a:p>
             <a:fld id="{0B266F5D-8C6C-4478-99DD-CF09E358A44F}" type="datetimeFigureOut">
               <a:rPr lang="en-US" smtClean="0"/>
-              <a:t>4/30/2017</a:t>
+              <a:t>5/2/2017</a:t>
             </a:fld>
             <a:endParaRPr lang="en-US"/>
           </a:p>
@@ -2703,7 +2704,7 @@
           <a:p>
             <a:fld id="{1EADC80A-2100-4656-A60C-07338B3F798A}" type="datetimeFigureOut">
               <a:rPr lang="en-US" smtClean="0"/>
-              <a:t>4/30/2017</a:t>
+              <a:t>5/2/2017</a:t>
             </a:fld>
             <a:endParaRPr lang="en-US"/>
           </a:p>
@@ -2916,7 +2917,7 @@
           <a:p>
             <a:fld id="{1EADC80A-2100-4656-A60C-07338B3F798A}" type="datetimeFigureOut">
               <a:rPr lang="en-US" smtClean="0"/>
-              <a:t>4/30/2017</a:t>
+              <a:t>5/2/2017</a:t>
             </a:fld>
             <a:endParaRPr lang="en-US"/>
           </a:p>
@@ -3174,7 +3175,7 @@
           <a:p>
             <a:fld id="{1EADC80A-2100-4656-A60C-07338B3F798A}" type="datetimeFigureOut">
               <a:rPr lang="en-US" smtClean="0"/>
-              <a:t>4/30/2017</a:t>
+              <a:t>5/2/2017</a:t>
             </a:fld>
             <a:endParaRPr lang="en-US"/>
           </a:p>
@@ -3349,7 +3350,7 @@
           <a:p>
             <a:fld id="{1EADC80A-2100-4656-A60C-07338B3F798A}" type="datetimeFigureOut">
               <a:rPr lang="en-US" smtClean="0"/>
-              <a:t>4/30/2017</a:t>
+              <a:t>5/2/2017</a:t>
             </a:fld>
             <a:endParaRPr lang="en-US"/>
           </a:p>
@@ -3686,7 +3687,7 @@
           <a:p>
             <a:fld id="{1EADC80A-2100-4656-A60C-07338B3F798A}" type="datetimeFigureOut">
               <a:rPr lang="en-US" smtClean="0"/>
-              <a:t>4/30/2017</a:t>
+              <a:t>5/2/2017</a:t>
             </a:fld>
             <a:endParaRPr lang="en-US"/>
           </a:p>
@@ -3966,7 +3967,7 @@
           <a:p>
             <a:fld id="{1EADC80A-2100-4656-A60C-07338B3F798A}" type="datetimeFigureOut">
               <a:rPr lang="en-US" smtClean="0"/>
-              <a:t>4/30/2017</a:t>
+              <a:t>5/2/2017</a:t>
             </a:fld>
             <a:endParaRPr lang="en-US"/>
           </a:p>
@@ -4350,7 +4351,7 @@
           <a:p>
             <a:fld id="{1EADC80A-2100-4656-A60C-07338B3F798A}" type="datetimeFigureOut">
               <a:rPr lang="en-US" smtClean="0"/>
-              <a:t>4/30/2017</a:t>
+              <a:t>5/2/2017</a:t>
             </a:fld>
             <a:endParaRPr lang="en-US"/>
           </a:p>
@@ -4473,7 +4474,7 @@
           <a:p>
             <a:fld id="{1EADC80A-2100-4656-A60C-07338B3F798A}" type="datetimeFigureOut">
               <a:rPr lang="en-US" smtClean="0"/>
-              <a:t>4/30/2017</a:t>
+              <a:t>5/2/2017</a:t>
             </a:fld>
             <a:endParaRPr lang="en-US"/>
           </a:p>
@@ -4646,7 +4647,7 @@
           <a:p>
             <a:fld id="{1EADC80A-2100-4656-A60C-07338B3F798A}" type="datetimeFigureOut">
               <a:rPr lang="en-US" smtClean="0"/>
-              <a:t>4/30/2017</a:t>
+              <a:t>5/2/2017</a:t>
             </a:fld>
             <a:endParaRPr lang="en-US"/>
           </a:p>
@@ -5002,7 +5003,7 @@
           <a:p>
             <a:fld id="{1EADC80A-2100-4656-A60C-07338B3F798A}" type="datetimeFigureOut">
               <a:rPr lang="en-US" smtClean="0"/>
-              <a:t>4/30/2017</a:t>
+              <a:t>5/2/2017</a:t>
             </a:fld>
             <a:endParaRPr lang="en-US"/>
           </a:p>
@@ -5386,7 +5387,7 @@
           <a:p>
             <a:fld id="{1EADC80A-2100-4656-A60C-07338B3F798A}" type="datetimeFigureOut">
               <a:rPr lang="en-US" smtClean="0"/>
-              <a:t>4/30/2017</a:t>
+              <a:t>5/2/2017</a:t>
             </a:fld>
             <a:endParaRPr lang="en-US"/>
           </a:p>
@@ -5675,7 +5676,7 @@
           <a:p>
             <a:fld id="{1EADC80A-2100-4656-A60C-07338B3F798A}" type="datetimeFigureOut">
               <a:rPr lang="en-US" smtClean="0"/>
-              <a:t>4/30/2017</a:t>
+              <a:t>5/2/2017</a:t>
             </a:fld>
             <a:endParaRPr lang="en-US"/>
           </a:p>
@@ -6307,9 +6308,10 @@
           <a:lstStyle/>
           <a:p>
             <a:r>
-              <a:rPr lang="en-US" dirty="0"/>
-              <a:t>Resources</a:t>
-            </a:r>
+              <a:rPr lang="en-US" dirty="0" err="1"/>
+              <a:t>Botiquette</a:t>
+            </a:r>
+            <a:endParaRPr lang="en-US" dirty="0"/>
           </a:p>
         </p:txBody>
       </p:sp>
@@ -6325,6 +6327,133 @@
         </p:nvSpPr>
         <p:spPr/>
         <p:txBody>
+          <a:bodyPr/>
+          <a:lstStyle/>
+          <a:p>
+            <a:r>
+              <a:rPr lang="en-US" dirty="0" err="1"/>
+              <a:t>Botiquette</a:t>
+            </a:r>
+            <a:r>
+              <a:rPr lang="en-US" dirty="0"/>
+              <a:t> (</a:t>
+            </a:r>
+            <a:r>
+              <a:rPr lang="en-US" dirty="0">
+                <a:hlinkClick r:id="rId2"/>
+              </a:rPr>
+              <a:t>http://bit.ly/1TWQ0Tp</a:t>
+            </a:r>
+            <a:r>
+              <a:rPr lang="en-US" dirty="0"/>
+              <a:t>)</a:t>
+            </a:r>
+          </a:p>
+          <a:p>
+            <a:pPr lvl="1"/>
+            <a:r>
+              <a:rPr lang="en-US" sz="1600" dirty="0"/>
+              <a:t>The customary code of polite behavior among bots and humans - often in social media, but also in apps, the enterprise, or any device where bot to bot and bot to human communication occur.</a:t>
+            </a:r>
+          </a:p>
+          <a:p>
+            <a:r>
+              <a:rPr lang="en-US" dirty="0"/>
+              <a:t>Tay and You (social luring attack)</a:t>
+            </a:r>
+          </a:p>
+          <a:p>
+            <a:r>
+              <a:rPr lang="en-US" dirty="0"/>
+              <a:t>Conversational Commerce (#</a:t>
+            </a:r>
+            <a:r>
+              <a:rPr lang="en-US" dirty="0" err="1"/>
+              <a:t>ConvComm</a:t>
+            </a:r>
+            <a:r>
+              <a:rPr lang="en-US" dirty="0"/>
+              <a:t>)</a:t>
+            </a:r>
+          </a:p>
+          <a:p>
+            <a:r>
+              <a:rPr lang="en-US" dirty="0"/>
+              <a:t>Bot or Not? (trying to act human)</a:t>
+            </a:r>
+          </a:p>
+          <a:p>
+            <a:r>
+              <a:rPr lang="en-US" dirty="0"/>
+              <a:t>Spam (notifications)</a:t>
+            </a:r>
+          </a:p>
+        </p:txBody>
+      </p:sp>
+    </p:spTree>
+    <p:extLst>
+      <p:ext uri="{BB962C8B-B14F-4D97-AF65-F5344CB8AC3E}">
+        <p14:creationId xmlns:p14="http://schemas.microsoft.com/office/powerpoint/2010/main" val="1811480033"/>
+      </p:ext>
+    </p:extLst>
+  </p:cSld>
+  <p:clrMapOvr>
+    <a:masterClrMapping/>
+  </p:clrMapOvr>
+</p:sld>
+</file>
+
+<file path=ppt/slides/slide11.xml><?xml version="1.0" encoding="utf-8"?>
+<p:sld xmlns:a="http://schemas.openxmlformats.org/drawingml/2006/main" xmlns:r="http://schemas.openxmlformats.org/officeDocument/2006/relationships" xmlns:p="http://schemas.openxmlformats.org/presentationml/2006/main">
+  <p:cSld>
+    <p:spTree>
+      <p:nvGrpSpPr>
+        <p:cNvPr id="1" name=""/>
+        <p:cNvGrpSpPr/>
+        <p:nvPr/>
+      </p:nvGrpSpPr>
+      <p:grpSpPr>
+        <a:xfrm>
+          <a:off x="0" y="0"/>
+          <a:ext cx="0" cy="0"/>
+          <a:chOff x="0" y="0"/>
+          <a:chExt cx="0" cy="0"/>
+        </a:xfrm>
+      </p:grpSpPr>
+      <p:sp>
+        <p:nvSpPr>
+          <p:cNvPr id="2" name="Title 1"/>
+          <p:cNvSpPr>
+            <a:spLocks noGrp="1"/>
+          </p:cNvSpPr>
+          <p:nvPr>
+            <p:ph type="title"/>
+          </p:nvPr>
+        </p:nvSpPr>
+        <p:spPr/>
+        <p:txBody>
+          <a:bodyPr/>
+          <a:lstStyle/>
+          <a:p>
+            <a:r>
+              <a:rPr lang="en-US" dirty="0"/>
+              <a:t>Resources</a:t>
+            </a:r>
+          </a:p>
+        </p:txBody>
+      </p:sp>
+      <p:sp>
+        <p:nvSpPr>
+          <p:cNvPr id="3" name="Content Placeholder 2"/>
+          <p:cNvSpPr>
+            <a:spLocks noGrp="1"/>
+          </p:cNvSpPr>
+          <p:nvPr>
+            <p:ph idx="1"/>
+          </p:nvPr>
+        </p:nvSpPr>
+        <p:spPr/>
+        <p:txBody>
           <a:bodyPr>
             <a:normAutofit/>
           </a:bodyPr>
@@ -6432,13 +6561,23 @@
           <a:p>
             <a:r>
               <a:rPr lang="en-US" dirty="0"/>
-              <a:t>Free MVA Course – Getting Started with Bots: </a:t>
+              <a:t>Free MVA Courses – node.js: </a:t>
             </a:r>
             <a:r>
               <a:rPr lang="en-US" dirty="0">
                 <a:hlinkClick r:id="rId8"/>
               </a:rPr>
               <a:t>http://bit.ly/2dnH4tV</a:t>
+            </a:r>
+            <a:r>
+              <a:rPr lang="en-US" dirty="0"/>
+              <a:t> &amp; C#: </a:t>
+            </a:r>
+            <a:r>
+              <a:rPr lang="en-US" dirty="0">
+                <a:hlinkClick r:id="rId9"/>
+              </a:rPr>
+              <a:t>http://bit.ly/2pGf8Hf</a:t>
             </a:r>
             <a:r>
               <a:rPr lang="en-US" dirty="0"/>
@@ -6487,7 +6626,7 @@
 </p:sld>
 </file>
 
-<file path=ppt/slides/slide11.xml><?xml version="1.0" encoding="utf-8"?>
+<file path=ppt/slides/slide12.xml><?xml version="1.0" encoding="utf-8"?>
 <p:sld xmlns:a="http://schemas.openxmlformats.org/drawingml/2006/main" xmlns:r="http://schemas.openxmlformats.org/officeDocument/2006/relationships" xmlns:p="http://schemas.openxmlformats.org/presentationml/2006/main">
   <p:cSld>
     <p:spTree>
@@ -6883,91 +7022,769 @@
           <a:p>
             <a:r>
               <a:rPr lang="en-US" dirty="0"/>
-              <a:t>Useful Activities</a:t>
-            </a:r>
-          </a:p>
-        </p:txBody>
-      </p:sp>
-      <p:sp>
-        <p:nvSpPr>
-          <p:cNvPr id="3" name="Content Placeholder 2"/>
-          <p:cNvSpPr>
-            <a:spLocks noGrp="1"/>
-          </p:cNvSpPr>
-          <p:nvPr>
-            <p:ph idx="1"/>
-          </p:nvPr>
-        </p:nvSpPr>
-        <p:spPr/>
-        <p:txBody>
-          <a:bodyPr>
-            <a:normAutofit/>
-          </a:bodyPr>
+              <a:t>Bot Framework Architecture</a:t>
+            </a:r>
+          </a:p>
+        </p:txBody>
+      </p:sp>
+      <p:sp>
+        <p:nvSpPr>
+          <p:cNvPr id="4" name="Rectangle 3"/>
+          <p:cNvSpPr/>
+          <p:nvPr/>
+        </p:nvSpPr>
+        <p:spPr>
+          <a:xfrm>
+            <a:off x="7500139" y="2198665"/>
+            <a:ext cx="3259599" cy="3831099"/>
+          </a:xfrm>
+          <a:prstGeom prst="rect">
+            <a:avLst/>
+          </a:prstGeom>
+        </p:spPr>
+        <p:style>
+          <a:lnRef idx="1">
+            <a:schemeClr val="accent2"/>
+          </a:lnRef>
+          <a:fillRef idx="2">
+            <a:schemeClr val="accent2"/>
+          </a:fillRef>
+          <a:effectRef idx="1">
+            <a:schemeClr val="accent2"/>
+          </a:effectRef>
+          <a:fontRef idx="minor">
+            <a:schemeClr val="dk1"/>
+          </a:fontRef>
+        </p:style>
+        <p:txBody>
+          <a:bodyPr rtlCol="0" anchor="ctr"/>
           <a:lstStyle/>
           <a:p>
+            <a:pPr algn="ctr"/>
+            <a:endParaRPr lang="en-US" dirty="0"/>
+          </a:p>
+        </p:txBody>
+      </p:sp>
+      <p:sp>
+        <p:nvSpPr>
+          <p:cNvPr id="6" name="Rounded Rectangle 5"/>
+          <p:cNvSpPr/>
+          <p:nvPr/>
+        </p:nvSpPr>
+        <p:spPr>
+          <a:xfrm>
+            <a:off x="9174826" y="2938404"/>
+            <a:ext cx="1407560" cy="914400"/>
+          </a:xfrm>
+          <a:prstGeom prst="roundRect">
+            <a:avLst/>
+          </a:prstGeom>
+        </p:spPr>
+        <p:style>
+          <a:lnRef idx="0">
+            <a:schemeClr val="accent2"/>
+          </a:lnRef>
+          <a:fillRef idx="3">
+            <a:schemeClr val="accent2"/>
+          </a:fillRef>
+          <a:effectRef idx="3">
+            <a:schemeClr val="accent2"/>
+          </a:effectRef>
+          <a:fontRef idx="minor">
+            <a:schemeClr val="lt1"/>
+          </a:fontRef>
+        </p:style>
+        <p:txBody>
+          <a:bodyPr rtlCol="0" anchor="ctr"/>
+          <a:lstStyle/>
+          <a:p>
+            <a:pPr algn="ctr"/>
             <a:r>
               <a:rPr lang="en-US" dirty="0"/>
-              <a:t>Besides Message, there are other activity types you should handle</a:t>
-            </a:r>
-          </a:p>
-          <a:p>
-            <a:pPr lvl="1"/>
+              <a:t>Bot </a:t>
+            </a:r>
             <a:r>
               <a:rPr lang="en-US" dirty="0" err="1"/>
-              <a:t>ConversationUpdate</a:t>
-            </a:r>
+              <a:t>Buidler</a:t>
+            </a:r>
+            <a:endParaRPr lang="en-US" dirty="0"/>
+          </a:p>
+        </p:txBody>
+      </p:sp>
+      <p:sp>
+        <p:nvSpPr>
+          <p:cNvPr id="7" name="Rounded Rectangle 6"/>
+          <p:cNvSpPr/>
+          <p:nvPr/>
+        </p:nvSpPr>
+        <p:spPr>
+          <a:xfrm>
+            <a:off x="9174826" y="3950414"/>
+            <a:ext cx="1407560" cy="914400"/>
+          </a:xfrm>
+          <a:prstGeom prst="roundRect">
+            <a:avLst/>
+          </a:prstGeom>
+        </p:spPr>
+        <p:style>
+          <a:lnRef idx="0">
+            <a:schemeClr val="accent2"/>
+          </a:lnRef>
+          <a:fillRef idx="3">
+            <a:schemeClr val="accent2"/>
+          </a:fillRef>
+          <a:effectRef idx="3">
+            <a:schemeClr val="accent2"/>
+          </a:effectRef>
+          <a:fontRef idx="minor">
+            <a:schemeClr val="lt1"/>
+          </a:fontRef>
+        </p:style>
+        <p:txBody>
+          <a:bodyPr rtlCol="0" anchor="ctr"/>
+          <a:lstStyle/>
+          <a:p>
+            <a:pPr algn="ctr"/>
             <a:r>
               <a:rPr lang="en-US" dirty="0"/>
-              <a:t> – When the user starts interacting with the chatbot</a:t>
-            </a:r>
-          </a:p>
-          <a:p>
-            <a:pPr lvl="1"/>
-            <a:r>
-              <a:rPr lang="en-US" dirty="0" err="1"/>
-              <a:t>DeleteUserData</a:t>
-            </a:r>
+              <a:t>Cognitive Services</a:t>
+            </a:r>
+          </a:p>
+        </p:txBody>
+      </p:sp>
+      <p:sp>
+        <p:nvSpPr>
+          <p:cNvPr id="8" name="Rounded Rectangle 7"/>
+          <p:cNvSpPr/>
+          <p:nvPr/>
+        </p:nvSpPr>
+        <p:spPr>
+          <a:xfrm>
+            <a:off x="9174826" y="4962424"/>
+            <a:ext cx="1407560" cy="914400"/>
+          </a:xfrm>
+          <a:prstGeom prst="roundRect">
+            <a:avLst/>
+          </a:prstGeom>
+        </p:spPr>
+        <p:style>
+          <a:lnRef idx="0">
+            <a:schemeClr val="accent2"/>
+          </a:lnRef>
+          <a:fillRef idx="3">
+            <a:schemeClr val="accent2"/>
+          </a:fillRef>
+          <a:effectRef idx="3">
+            <a:schemeClr val="accent2"/>
+          </a:effectRef>
+          <a:fontRef idx="minor">
+            <a:schemeClr val="lt1"/>
+          </a:fontRef>
+        </p:style>
+        <p:txBody>
+          <a:bodyPr rtlCol="0" anchor="ctr"/>
+          <a:lstStyle/>
+          <a:p>
+            <a:pPr algn="ctr"/>
             <a:r>
               <a:rPr lang="en-US" dirty="0"/>
-              <a:t> – Clean/Remove all Personally Identifiable Information (PII)</a:t>
-            </a:r>
-          </a:p>
-          <a:p>
+              <a:t>Other Services</a:t>
+            </a:r>
+          </a:p>
+        </p:txBody>
+      </p:sp>
+      <p:sp>
+        <p:nvSpPr>
+          <p:cNvPr id="9" name="Rounded Rectangle 8"/>
+          <p:cNvSpPr/>
+          <p:nvPr/>
+        </p:nvSpPr>
+        <p:spPr>
+          <a:xfrm>
+            <a:off x="7697916" y="2938404"/>
+            <a:ext cx="1340778" cy="2938420"/>
+          </a:xfrm>
+          <a:prstGeom prst="roundRect">
+            <a:avLst/>
+          </a:prstGeom>
+        </p:spPr>
+        <p:style>
+          <a:lnRef idx="0">
+            <a:schemeClr val="accent2"/>
+          </a:lnRef>
+          <a:fillRef idx="3">
+            <a:schemeClr val="accent2"/>
+          </a:fillRef>
+          <a:effectRef idx="3">
+            <a:schemeClr val="accent2"/>
+          </a:effectRef>
+          <a:fontRef idx="minor">
+            <a:schemeClr val="lt1"/>
+          </a:fontRef>
+        </p:style>
+        <p:txBody>
+          <a:bodyPr rtlCol="0" anchor="ctr"/>
+          <a:lstStyle/>
+          <a:p>
+            <a:pPr algn="ctr"/>
             <a:r>
               <a:rPr lang="en-US" dirty="0"/>
-              <a:t>Other activities Might not be as important</a:t>
-            </a:r>
-          </a:p>
-          <a:p>
-            <a:pPr lvl="1"/>
-            <a:r>
-              <a:rPr lang="en-US" dirty="0" err="1"/>
-              <a:t>ContactRelationUpdate</a:t>
-            </a:r>
+              <a:t>REST Service</a:t>
+            </a:r>
+          </a:p>
+        </p:txBody>
+      </p:sp>
+      <p:sp>
+        <p:nvSpPr>
+          <p:cNvPr id="11" name="Rectangle 10"/>
+          <p:cNvSpPr/>
+          <p:nvPr/>
+        </p:nvSpPr>
+        <p:spPr>
+          <a:xfrm>
+            <a:off x="7653028" y="2328253"/>
+            <a:ext cx="2861352" cy="410967"/>
+          </a:xfrm>
+          <a:prstGeom prst="rect">
+            <a:avLst/>
+          </a:prstGeom>
+          <a:noFill/>
+          <a:ln>
+            <a:noFill/>
+          </a:ln>
+        </p:spPr>
+        <p:style>
+          <a:lnRef idx="2">
+            <a:schemeClr val="accent1"/>
+          </a:lnRef>
+          <a:fillRef idx="1">
+            <a:schemeClr val="lt1"/>
+          </a:fillRef>
+          <a:effectRef idx="0">
+            <a:schemeClr val="accent1"/>
+          </a:effectRef>
+          <a:fontRef idx="minor">
+            <a:schemeClr val="dk1"/>
+          </a:fontRef>
+        </p:style>
+        <p:txBody>
+          <a:bodyPr rtlCol="0" anchor="ctr"/>
+          <a:lstStyle/>
+          <a:p>
+            <a:pPr algn="ctr"/>
             <a:r>
               <a:rPr lang="en-US" dirty="0"/>
-              <a:t> – User Unsubscribes from Chatbot</a:t>
-            </a:r>
-          </a:p>
-          <a:p>
-            <a:pPr lvl="2"/>
+              <a:t>Your Bot</a:t>
+            </a:r>
+          </a:p>
+        </p:txBody>
+      </p:sp>
+      <p:sp>
+        <p:nvSpPr>
+          <p:cNvPr id="12" name="Rounded Rectangle 11"/>
+          <p:cNvSpPr/>
+          <p:nvPr/>
+        </p:nvSpPr>
+        <p:spPr>
+          <a:xfrm>
+            <a:off x="4166171" y="2879326"/>
+            <a:ext cx="2232063" cy="2232063"/>
+          </a:xfrm>
+          <a:prstGeom prst="roundRect">
+            <a:avLst/>
+          </a:prstGeom>
+        </p:spPr>
+        <p:style>
+          <a:lnRef idx="0">
+            <a:schemeClr val="accent4"/>
+          </a:lnRef>
+          <a:fillRef idx="3">
+            <a:schemeClr val="accent4"/>
+          </a:fillRef>
+          <a:effectRef idx="3">
+            <a:schemeClr val="accent4"/>
+          </a:effectRef>
+          <a:fontRef idx="minor">
+            <a:schemeClr val="lt1"/>
+          </a:fontRef>
+        </p:style>
+        <p:txBody>
+          <a:bodyPr rtlCol="0" anchor="ctr"/>
+          <a:lstStyle/>
+          <a:p>
+            <a:pPr algn="ctr"/>
             <a:r>
               <a:rPr lang="en-US" dirty="0"/>
-              <a:t>Maybe for housekeeping. E.g. if you send notifications and need to remove them from the list</a:t>
-            </a:r>
-          </a:p>
-          <a:p>
-            <a:pPr lvl="1"/>
+              <a:t>Bot Connector</a:t>
+            </a:r>
+          </a:p>
+        </p:txBody>
+      </p:sp>
+      <p:sp>
+        <p:nvSpPr>
+          <p:cNvPr id="13" name="Left-Right Arrow 12"/>
+          <p:cNvSpPr/>
+          <p:nvPr/>
+        </p:nvSpPr>
+        <p:spPr>
+          <a:xfrm>
+            <a:off x="6382876" y="3871898"/>
+            <a:ext cx="1117262" cy="484632"/>
+          </a:xfrm>
+          <a:prstGeom prst="leftRightArrow">
+            <a:avLst/>
+          </a:prstGeom>
+        </p:spPr>
+        <p:style>
+          <a:lnRef idx="1">
+            <a:schemeClr val="accent1"/>
+          </a:lnRef>
+          <a:fillRef idx="2">
+            <a:schemeClr val="accent1"/>
+          </a:fillRef>
+          <a:effectRef idx="1">
+            <a:schemeClr val="accent1"/>
+          </a:effectRef>
+          <a:fontRef idx="minor">
+            <a:schemeClr val="dk1"/>
+          </a:fontRef>
+        </p:style>
+        <p:txBody>
+          <a:bodyPr rtlCol="0" anchor="ctr"/>
+          <a:lstStyle/>
+          <a:p>
+            <a:pPr algn="ctr"/>
+            <a:endParaRPr lang="en-US"/>
+          </a:p>
+        </p:txBody>
+      </p:sp>
+      <p:sp>
+        <p:nvSpPr>
+          <p:cNvPr id="14" name="Rounded Rectangle 13"/>
+          <p:cNvSpPr/>
+          <p:nvPr/>
+        </p:nvSpPr>
+        <p:spPr>
+          <a:xfrm>
+            <a:off x="1017142" y="2887029"/>
+            <a:ext cx="1021634" cy="575353"/>
+          </a:xfrm>
+          <a:prstGeom prst="roundRect">
+            <a:avLst/>
+          </a:prstGeom>
+        </p:spPr>
+        <p:style>
+          <a:lnRef idx="0">
+            <a:schemeClr val="accent3"/>
+          </a:lnRef>
+          <a:fillRef idx="3">
+            <a:schemeClr val="accent3"/>
+          </a:fillRef>
+          <a:effectRef idx="3">
+            <a:schemeClr val="accent3"/>
+          </a:effectRef>
+          <a:fontRef idx="minor">
+            <a:schemeClr val="lt1"/>
+          </a:fontRef>
+        </p:style>
+        <p:txBody>
+          <a:bodyPr rtlCol="0" anchor="ctr"/>
+          <a:lstStyle/>
+          <a:p>
+            <a:pPr algn="ctr"/>
             <a:r>
               <a:rPr lang="en-US" dirty="0"/>
-              <a:t>Typing – User is typing a Message</a:t>
-            </a:r>
-          </a:p>
-          <a:p>
-            <a:pPr lvl="2"/>
+              <a:t>Channel</a:t>
+            </a:r>
+          </a:p>
+        </p:txBody>
+      </p:sp>
+      <p:sp>
+        <p:nvSpPr>
+          <p:cNvPr id="15" name="Rounded Rectangle 14"/>
+          <p:cNvSpPr/>
+          <p:nvPr/>
+        </p:nvSpPr>
+        <p:spPr>
+          <a:xfrm>
+            <a:off x="1351052" y="2046551"/>
+            <a:ext cx="1062090" cy="575353"/>
+          </a:xfrm>
+          <a:prstGeom prst="roundRect">
+            <a:avLst/>
+          </a:prstGeom>
+        </p:spPr>
+        <p:style>
+          <a:lnRef idx="0">
+            <a:schemeClr val="accent3"/>
+          </a:lnRef>
+          <a:fillRef idx="3">
+            <a:schemeClr val="accent3"/>
+          </a:fillRef>
+          <a:effectRef idx="3">
+            <a:schemeClr val="accent3"/>
+          </a:effectRef>
+          <a:fontRef idx="minor">
+            <a:schemeClr val="lt1"/>
+          </a:fontRef>
+        </p:style>
+        <p:txBody>
+          <a:bodyPr rtlCol="0" anchor="ctr"/>
+          <a:lstStyle/>
+          <a:p>
+            <a:pPr algn="ctr"/>
             <a:r>
               <a:rPr lang="en-US" dirty="0"/>
-              <a:t>Might not be simple with a chatbot scaled to multiple instances</a:t>
+              <a:t>Channel</a:t>
+            </a:r>
+          </a:p>
+        </p:txBody>
+      </p:sp>
+      <p:sp>
+        <p:nvSpPr>
+          <p:cNvPr id="16" name="Rounded Rectangle 15"/>
+          <p:cNvSpPr/>
+          <p:nvPr/>
+        </p:nvSpPr>
+        <p:spPr>
+          <a:xfrm>
+            <a:off x="827070" y="3799156"/>
+            <a:ext cx="1046679" cy="575353"/>
+          </a:xfrm>
+          <a:prstGeom prst="roundRect">
+            <a:avLst/>
+          </a:prstGeom>
+        </p:spPr>
+        <p:style>
+          <a:lnRef idx="0">
+            <a:schemeClr val="accent3"/>
+          </a:lnRef>
+          <a:fillRef idx="3">
+            <a:schemeClr val="accent3"/>
+          </a:fillRef>
+          <a:effectRef idx="3">
+            <a:schemeClr val="accent3"/>
+          </a:effectRef>
+          <a:fontRef idx="minor">
+            <a:schemeClr val="lt1"/>
+          </a:fontRef>
+        </p:style>
+        <p:txBody>
+          <a:bodyPr rtlCol="0" anchor="ctr"/>
+          <a:lstStyle/>
+          <a:p>
+            <a:pPr algn="ctr"/>
+            <a:r>
+              <a:rPr lang="en-US" dirty="0"/>
+              <a:t>Channel</a:t>
+            </a:r>
+          </a:p>
+        </p:txBody>
+      </p:sp>
+      <p:sp>
+        <p:nvSpPr>
+          <p:cNvPr id="17" name="Rounded Rectangle 16"/>
+          <p:cNvSpPr/>
+          <p:nvPr/>
+        </p:nvSpPr>
+        <p:spPr>
+          <a:xfrm>
+            <a:off x="1017142" y="4711283"/>
+            <a:ext cx="1021634" cy="575353"/>
+          </a:xfrm>
+          <a:prstGeom prst="roundRect">
+            <a:avLst/>
+          </a:prstGeom>
+        </p:spPr>
+        <p:style>
+          <a:lnRef idx="0">
+            <a:schemeClr val="accent3"/>
+          </a:lnRef>
+          <a:fillRef idx="3">
+            <a:schemeClr val="accent3"/>
+          </a:fillRef>
+          <a:effectRef idx="3">
+            <a:schemeClr val="accent3"/>
+          </a:effectRef>
+          <a:fontRef idx="minor">
+            <a:schemeClr val="lt1"/>
+          </a:fontRef>
+        </p:style>
+        <p:txBody>
+          <a:bodyPr rtlCol="0" anchor="ctr"/>
+          <a:lstStyle/>
+          <a:p>
+            <a:pPr algn="ctr"/>
+            <a:r>
+              <a:rPr lang="en-US" dirty="0"/>
+              <a:t>Channel</a:t>
+            </a:r>
+          </a:p>
+        </p:txBody>
+      </p:sp>
+      <p:sp>
+        <p:nvSpPr>
+          <p:cNvPr id="18" name="Rounded Rectangle 17"/>
+          <p:cNvSpPr/>
+          <p:nvPr/>
+        </p:nvSpPr>
+        <p:spPr>
+          <a:xfrm>
+            <a:off x="1304818" y="5537163"/>
+            <a:ext cx="1108324" cy="575353"/>
+          </a:xfrm>
+          <a:prstGeom prst="roundRect">
+            <a:avLst/>
+          </a:prstGeom>
+        </p:spPr>
+        <p:style>
+          <a:lnRef idx="0">
+            <a:schemeClr val="accent3"/>
+          </a:lnRef>
+          <a:fillRef idx="3">
+            <a:schemeClr val="accent3"/>
+          </a:fillRef>
+          <a:effectRef idx="3">
+            <a:schemeClr val="accent3"/>
+          </a:effectRef>
+          <a:fontRef idx="minor">
+            <a:schemeClr val="lt1"/>
+          </a:fontRef>
+        </p:style>
+        <p:txBody>
+          <a:bodyPr rtlCol="0" anchor="ctr"/>
+          <a:lstStyle/>
+          <a:p>
+            <a:pPr algn="ctr"/>
+            <a:r>
+              <a:rPr lang="en-US" dirty="0"/>
+              <a:t>Channel</a:t>
+            </a:r>
+          </a:p>
+        </p:txBody>
+      </p:sp>
+      <p:cxnSp>
+        <p:nvCxnSpPr>
+          <p:cNvPr id="20" name="Straight Arrow Connector 19"/>
+          <p:cNvCxnSpPr>
+            <a:stCxn id="15" idx="3"/>
+            <a:endCxn id="12" idx="1"/>
+          </p:cNvCxnSpPr>
+          <p:nvPr/>
+        </p:nvCxnSpPr>
+        <p:spPr>
+          <a:xfrm>
+            <a:off x="2413142" y="2334228"/>
+            <a:ext cx="1753029" cy="1661130"/>
+          </a:xfrm>
+          <a:prstGeom prst="straightConnector1">
+            <a:avLst/>
+          </a:prstGeom>
+          <a:ln>
+            <a:headEnd type="triangle"/>
+            <a:tailEnd type="triangle"/>
+          </a:ln>
+        </p:spPr>
+        <p:style>
+          <a:lnRef idx="1">
+            <a:schemeClr val="accent1"/>
+          </a:lnRef>
+          <a:fillRef idx="0">
+            <a:schemeClr val="accent1"/>
+          </a:fillRef>
+          <a:effectRef idx="0">
+            <a:schemeClr val="accent1"/>
+          </a:effectRef>
+          <a:fontRef idx="minor">
+            <a:schemeClr val="tx1"/>
+          </a:fontRef>
+        </p:style>
+      </p:cxnSp>
+      <p:cxnSp>
+        <p:nvCxnSpPr>
+          <p:cNvPr id="21" name="Straight Arrow Connector 20"/>
+          <p:cNvCxnSpPr>
+            <a:stCxn id="14" idx="3"/>
+            <a:endCxn id="12" idx="1"/>
+          </p:cNvCxnSpPr>
+          <p:nvPr/>
+        </p:nvCxnSpPr>
+        <p:spPr>
+          <a:xfrm>
+            <a:off x="2038776" y="3174706"/>
+            <a:ext cx="2127395" cy="820652"/>
+          </a:xfrm>
+          <a:prstGeom prst="straightConnector1">
+            <a:avLst/>
+          </a:prstGeom>
+          <a:ln>
+            <a:headEnd type="triangle"/>
+            <a:tailEnd type="triangle"/>
+          </a:ln>
+        </p:spPr>
+        <p:style>
+          <a:lnRef idx="1">
+            <a:schemeClr val="accent1"/>
+          </a:lnRef>
+          <a:fillRef idx="0">
+            <a:schemeClr val="accent1"/>
+          </a:fillRef>
+          <a:effectRef idx="0">
+            <a:schemeClr val="accent1"/>
+          </a:effectRef>
+          <a:fontRef idx="minor">
+            <a:schemeClr val="tx1"/>
+          </a:fontRef>
+        </p:style>
+      </p:cxnSp>
+      <p:cxnSp>
+        <p:nvCxnSpPr>
+          <p:cNvPr id="22" name="Straight Arrow Connector 21"/>
+          <p:cNvCxnSpPr>
+            <a:stCxn id="16" idx="3"/>
+            <a:endCxn id="12" idx="1"/>
+          </p:cNvCxnSpPr>
+          <p:nvPr/>
+        </p:nvCxnSpPr>
+        <p:spPr>
+          <a:xfrm flipV="1">
+            <a:off x="1873749" y="3995358"/>
+            <a:ext cx="2292422" cy="91475"/>
+          </a:xfrm>
+          <a:prstGeom prst="straightConnector1">
+            <a:avLst/>
+          </a:prstGeom>
+          <a:ln>
+            <a:headEnd type="triangle"/>
+            <a:tailEnd type="triangle"/>
+          </a:ln>
+        </p:spPr>
+        <p:style>
+          <a:lnRef idx="1">
+            <a:schemeClr val="accent1"/>
+          </a:lnRef>
+          <a:fillRef idx="0">
+            <a:schemeClr val="accent1"/>
+          </a:fillRef>
+          <a:effectRef idx="0">
+            <a:schemeClr val="accent1"/>
+          </a:effectRef>
+          <a:fontRef idx="minor">
+            <a:schemeClr val="tx1"/>
+          </a:fontRef>
+        </p:style>
+      </p:cxnSp>
+      <p:cxnSp>
+        <p:nvCxnSpPr>
+          <p:cNvPr id="23" name="Straight Arrow Connector 22"/>
+          <p:cNvCxnSpPr>
+            <a:stCxn id="17" idx="3"/>
+            <a:endCxn id="12" idx="1"/>
+          </p:cNvCxnSpPr>
+          <p:nvPr/>
+        </p:nvCxnSpPr>
+        <p:spPr>
+          <a:xfrm flipV="1">
+            <a:off x="2038776" y="3995358"/>
+            <a:ext cx="2127395" cy="1003602"/>
+          </a:xfrm>
+          <a:prstGeom prst="straightConnector1">
+            <a:avLst/>
+          </a:prstGeom>
+          <a:ln>
+            <a:headEnd type="triangle"/>
+            <a:tailEnd type="triangle"/>
+          </a:ln>
+        </p:spPr>
+        <p:style>
+          <a:lnRef idx="1">
+            <a:schemeClr val="accent1"/>
+          </a:lnRef>
+          <a:fillRef idx="0">
+            <a:schemeClr val="accent1"/>
+          </a:fillRef>
+          <a:effectRef idx="0">
+            <a:schemeClr val="accent1"/>
+          </a:effectRef>
+          <a:fontRef idx="minor">
+            <a:schemeClr val="tx1"/>
+          </a:fontRef>
+        </p:style>
+      </p:cxnSp>
+      <p:cxnSp>
+        <p:nvCxnSpPr>
+          <p:cNvPr id="24" name="Straight Arrow Connector 23"/>
+          <p:cNvCxnSpPr>
+            <a:stCxn id="18" idx="3"/>
+            <a:endCxn id="12" idx="1"/>
+          </p:cNvCxnSpPr>
+          <p:nvPr/>
+        </p:nvCxnSpPr>
+        <p:spPr>
+          <a:xfrm flipV="1">
+            <a:off x="2413142" y="3995358"/>
+            <a:ext cx="1753029" cy="1829482"/>
+          </a:xfrm>
+          <a:prstGeom prst="straightConnector1">
+            <a:avLst/>
+          </a:prstGeom>
+          <a:ln>
+            <a:headEnd type="triangle"/>
+            <a:tailEnd type="triangle"/>
+          </a:ln>
+        </p:spPr>
+        <p:style>
+          <a:lnRef idx="1">
+            <a:schemeClr val="accent1"/>
+          </a:lnRef>
+          <a:fillRef idx="0">
+            <a:schemeClr val="accent1"/>
+          </a:fillRef>
+          <a:effectRef idx="0">
+            <a:schemeClr val="accent1"/>
+          </a:effectRef>
+          <a:fontRef idx="minor">
+            <a:schemeClr val="tx1"/>
+          </a:fontRef>
+        </p:style>
+      </p:cxnSp>
+      <p:sp>
+        <p:nvSpPr>
+          <p:cNvPr id="25" name="Rounded Rectangle 11"/>
+          <p:cNvSpPr/>
+          <p:nvPr/>
+        </p:nvSpPr>
+        <p:spPr>
+          <a:xfrm>
+            <a:off x="4590382" y="4910099"/>
+            <a:ext cx="1386490" cy="561270"/>
+          </a:xfrm>
+          <a:prstGeom prst="roundRect">
+            <a:avLst/>
+          </a:prstGeom>
+        </p:spPr>
+        <p:style>
+          <a:lnRef idx="0">
+            <a:schemeClr val="accent4"/>
+          </a:lnRef>
+          <a:fillRef idx="3">
+            <a:schemeClr val="accent4"/>
+          </a:fillRef>
+          <a:effectRef idx="3">
+            <a:schemeClr val="accent4"/>
+          </a:effectRef>
+          <a:fontRef idx="minor">
+            <a:schemeClr val="lt1"/>
+          </a:fontRef>
+        </p:style>
+        <p:txBody>
+          <a:bodyPr rtlCol="0" anchor="ctr"/>
+          <a:lstStyle/>
+          <a:p>
+            <a:pPr algn="ctr"/>
+            <a:r>
+              <a:rPr lang="en-US" dirty="0"/>
+              <a:t>Bot State Service</a:t>
             </a:r>
           </a:p>
         </p:txBody>
@@ -6975,7 +7792,7 @@
     </p:spTree>
     <p:extLst>
       <p:ext uri="{BB962C8B-B14F-4D97-AF65-F5344CB8AC3E}">
-        <p14:creationId xmlns:p14="http://schemas.microsoft.com/office/powerpoint/2010/main" val="2311622519"/>
+        <p14:creationId xmlns:p14="http://schemas.microsoft.com/office/powerpoint/2010/main" val="2334335754"/>
       </p:ext>
     </p:extLst>
   </p:cSld>
@@ -7019,7 +7836,7 @@
           <a:p>
             <a:r>
               <a:rPr lang="en-US" dirty="0"/>
-              <a:t>Customizing FormFlow</a:t>
+              <a:t>Useful Activities</a:t>
             </a:r>
           </a:p>
         </p:txBody>
@@ -7036,47 +7853,82 @@
         </p:nvSpPr>
         <p:spPr/>
         <p:txBody>
-          <a:bodyPr/>
+          <a:bodyPr>
+            <a:normAutofit/>
+          </a:bodyPr>
           <a:lstStyle/>
           <a:p>
             <a:r>
               <a:rPr lang="en-US" dirty="0"/>
-              <a:t>Field Attributes</a:t>
-            </a:r>
-          </a:p>
-          <a:p>
+              <a:t>Besides Message, there are other activity types you should handle</a:t>
+            </a:r>
+          </a:p>
+          <a:p>
+            <a:pPr lvl="1"/>
+            <a:r>
+              <a:rPr lang="en-US" dirty="0" err="1"/>
+              <a:t>ConversationUpdate</a:t>
+            </a:r>
             <a:r>
               <a:rPr lang="en-US" dirty="0"/>
-              <a:t>Fields with dynamic content</a:t>
-            </a:r>
-          </a:p>
-          <a:p>
+              <a:t> – When the user starts interacting with the chatbot</a:t>
+            </a:r>
+          </a:p>
+          <a:p>
+            <a:pPr lvl="1"/>
+            <a:r>
+              <a:rPr lang="en-US" dirty="0" err="1"/>
+              <a:t>DeleteUserData</a:t>
+            </a:r>
             <a:r>
               <a:rPr lang="en-US" dirty="0"/>
-              <a:t>Field validation</a:t>
+              <a:t> – Clean/Remove all Personally Identifiable Information (PII)</a:t>
             </a:r>
           </a:p>
           <a:p>
             <a:r>
               <a:rPr lang="en-US" dirty="0"/>
-              <a:t>Confirmation</a:t>
-            </a:r>
-          </a:p>
-          <a:p>
+              <a:t>Other activities Might not be as important</a:t>
+            </a:r>
+          </a:p>
+          <a:p>
+            <a:pPr lvl="1"/>
+            <a:r>
+              <a:rPr lang="en-US" dirty="0" err="1"/>
+              <a:t>ContactRelationUpdate</a:t>
+            </a:r>
             <a:r>
               <a:rPr lang="en-US" dirty="0"/>
-              <a:t>Handling the Quit Message</a:t>
-            </a:r>
-          </a:p>
-          <a:p>
-            <a:endParaRPr lang="en-US" dirty="0"/>
+              <a:t> – User Unsubscribes from Chatbot</a:t>
+            </a:r>
+          </a:p>
+          <a:p>
+            <a:pPr lvl="2"/>
+            <a:r>
+              <a:rPr lang="en-US" dirty="0"/>
+              <a:t>Maybe for housekeeping. E.g. if you send notifications and need to remove them from the list</a:t>
+            </a:r>
+          </a:p>
+          <a:p>
+            <a:pPr lvl="1"/>
+            <a:r>
+              <a:rPr lang="en-US" dirty="0"/>
+              <a:t>Typing – User is typing a Message</a:t>
+            </a:r>
+          </a:p>
+          <a:p>
+            <a:pPr lvl="2"/>
+            <a:r>
+              <a:rPr lang="en-US" dirty="0"/>
+              <a:t>Might not be simple with a chatbot scaled to multiple instances</a:t>
+            </a:r>
           </a:p>
         </p:txBody>
       </p:sp>
     </p:spTree>
     <p:extLst>
       <p:ext uri="{BB962C8B-B14F-4D97-AF65-F5344CB8AC3E}">
-        <p14:creationId xmlns:p14="http://schemas.microsoft.com/office/powerpoint/2010/main" val="615238394"/>
+        <p14:creationId xmlns:p14="http://schemas.microsoft.com/office/powerpoint/2010/main" val="2311622519"/>
       </p:ext>
     </p:extLst>
   </p:cSld>
@@ -7119,10 +7971,9 @@
           <a:lstStyle/>
           <a:p>
             <a:r>
-              <a:rPr lang="en-US" dirty="0" err="1"/>
-              <a:t>IScorable</a:t>
-            </a:r>
-            <a:endParaRPr lang="en-US" dirty="0"/>
+              <a:rPr lang="en-US" dirty="0"/>
+              <a:t>Customizing FormFlow</a:t>
+            </a:r>
           </a:p>
         </p:txBody>
       </p:sp>
@@ -7136,1423 +7987,41 @@
             <p:ph idx="1"/>
           </p:nvPr>
         </p:nvSpPr>
-        <p:spPr>
-          <a:xfrm>
-            <a:off x="1097280" y="1845733"/>
-            <a:ext cx="10058400" cy="4430827"/>
-          </a:xfrm>
-        </p:spPr>
-        <p:txBody>
-          <a:bodyPr>
-            <a:normAutofit fontScale="70000" lnSpcReduction="20000"/>
-          </a:bodyPr>
+        <p:spPr/>
+        <p:txBody>
+          <a:bodyPr/>
           <a:lstStyle/>
           <a:p>
             <a:r>
-              <a:rPr lang="en-US" dirty="0">
-                <a:solidFill>
-                  <a:srgbClr val="000000"/>
-                </a:solidFill>
-                <a:latin typeface="Consolas" panose="020B0609020204030204" pitchFamily="49" charset="0"/>
-              </a:rPr>
-              <a:t>    </a:t>
-            </a:r>
-            <a:r>
-              <a:rPr lang="en-US" dirty="0">
-                <a:solidFill>
-                  <a:srgbClr val="0000FF"/>
-                </a:solidFill>
-                <a:latin typeface="Consolas" panose="020B0609020204030204" pitchFamily="49" charset="0"/>
-              </a:rPr>
-              <a:t>public</a:t>
-            </a:r>
-            <a:r>
-              <a:rPr lang="en-US" dirty="0">
-                <a:solidFill>
-                  <a:srgbClr val="000000"/>
-                </a:solidFill>
-                <a:latin typeface="Consolas" panose="020B0609020204030204" pitchFamily="49" charset="0"/>
-              </a:rPr>
-              <a:t> </a:t>
-            </a:r>
-            <a:r>
-              <a:rPr lang="en-US" dirty="0">
-                <a:solidFill>
-                  <a:srgbClr val="0000FF"/>
-                </a:solidFill>
-                <a:latin typeface="Consolas" panose="020B0609020204030204" pitchFamily="49" charset="0"/>
-              </a:rPr>
-              <a:t>interface</a:t>
-            </a:r>
-            <a:r>
-              <a:rPr lang="en-US" dirty="0">
-                <a:solidFill>
-                  <a:srgbClr val="000000"/>
-                </a:solidFill>
-                <a:latin typeface="Consolas" panose="020B0609020204030204" pitchFamily="49" charset="0"/>
-              </a:rPr>
-              <a:t> </a:t>
-            </a:r>
-            <a:r>
-              <a:rPr lang="en-US" dirty="0" err="1">
-                <a:solidFill>
-                  <a:srgbClr val="2B91AF"/>
-                </a:solidFill>
-                <a:latin typeface="Consolas" panose="020B0609020204030204" pitchFamily="49" charset="0"/>
-              </a:rPr>
-              <a:t>IScorable</a:t>
-            </a:r>
-            <a:r>
-              <a:rPr lang="en-US" dirty="0">
-                <a:solidFill>
-                  <a:srgbClr val="000000"/>
-                </a:solidFill>
-                <a:latin typeface="Consolas" panose="020B0609020204030204" pitchFamily="49" charset="0"/>
-              </a:rPr>
-              <a:t>&lt;</a:t>
-            </a:r>
-            <a:r>
-              <a:rPr lang="en-US" dirty="0">
-                <a:solidFill>
-                  <a:srgbClr val="0000FF"/>
-                </a:solidFill>
-                <a:latin typeface="Consolas" panose="020B0609020204030204" pitchFamily="49" charset="0"/>
-              </a:rPr>
-              <a:t>in</a:t>
-            </a:r>
-            <a:r>
-              <a:rPr lang="en-US" dirty="0">
-                <a:solidFill>
-                  <a:srgbClr val="000000"/>
-                </a:solidFill>
-                <a:latin typeface="Consolas" panose="020B0609020204030204" pitchFamily="49" charset="0"/>
-              </a:rPr>
-              <a:t> </a:t>
-            </a:r>
-            <a:r>
-              <a:rPr lang="en-US" dirty="0">
-                <a:solidFill>
-                  <a:srgbClr val="2B91AF"/>
-                </a:solidFill>
-                <a:latin typeface="Consolas" panose="020B0609020204030204" pitchFamily="49" charset="0"/>
-              </a:rPr>
-              <a:t>Item</a:t>
-            </a:r>
-            <a:r>
-              <a:rPr lang="en-US" dirty="0">
-                <a:solidFill>
-                  <a:srgbClr val="000000"/>
-                </a:solidFill>
-                <a:latin typeface="Consolas" panose="020B0609020204030204" pitchFamily="49" charset="0"/>
-              </a:rPr>
-              <a:t>, </a:t>
-            </a:r>
-            <a:r>
-              <a:rPr lang="en-US" dirty="0">
-                <a:solidFill>
-                  <a:srgbClr val="0000FF"/>
-                </a:solidFill>
-                <a:latin typeface="Consolas" panose="020B0609020204030204" pitchFamily="49" charset="0"/>
-              </a:rPr>
-              <a:t>out</a:t>
-            </a:r>
-            <a:r>
-              <a:rPr lang="en-US" dirty="0">
-                <a:solidFill>
-                  <a:srgbClr val="000000"/>
-                </a:solidFill>
-                <a:latin typeface="Consolas" panose="020B0609020204030204" pitchFamily="49" charset="0"/>
-              </a:rPr>
-              <a:t> </a:t>
-            </a:r>
-            <a:r>
-              <a:rPr lang="en-US" dirty="0">
-                <a:solidFill>
-                  <a:srgbClr val="2B91AF"/>
-                </a:solidFill>
-                <a:latin typeface="Consolas" panose="020B0609020204030204" pitchFamily="49" charset="0"/>
-              </a:rPr>
-              <a:t>Score</a:t>
-            </a:r>
-            <a:r>
-              <a:rPr lang="en-US" dirty="0">
-                <a:solidFill>
-                  <a:srgbClr val="000000"/>
-                </a:solidFill>
-                <a:latin typeface="Consolas" panose="020B0609020204030204" pitchFamily="49" charset="0"/>
-              </a:rPr>
-              <a:t>&gt;</a:t>
-            </a:r>
-            <a:br>
-              <a:rPr lang="en-US" dirty="0">
-                <a:solidFill>
-                  <a:srgbClr val="000000"/>
-                </a:solidFill>
-                <a:latin typeface="Consolas" panose="020B0609020204030204" pitchFamily="49" charset="0"/>
-              </a:rPr>
-            </a:br>
-            <a:r>
-              <a:rPr lang="en-US" dirty="0">
-                <a:solidFill>
-                  <a:srgbClr val="000000"/>
-                </a:solidFill>
-                <a:latin typeface="Consolas" panose="020B0609020204030204" pitchFamily="49" charset="0"/>
-              </a:rPr>
-              <a:t>    {</a:t>
-            </a:r>
-            <a:br>
-              <a:rPr lang="en-US" dirty="0">
-                <a:solidFill>
-                  <a:srgbClr val="000000"/>
-                </a:solidFill>
-                <a:latin typeface="Consolas" panose="020B0609020204030204" pitchFamily="49" charset="0"/>
-              </a:rPr>
-            </a:br>
-            <a:r>
-              <a:rPr lang="en-US" dirty="0">
-                <a:solidFill>
-                  <a:srgbClr val="000000"/>
-                </a:solidFill>
-                <a:latin typeface="Consolas" panose="020B0609020204030204" pitchFamily="49" charset="0"/>
-              </a:rPr>
-              <a:t>        </a:t>
-            </a:r>
-            <a:r>
-              <a:rPr lang="en-US" dirty="0">
-                <a:solidFill>
-                  <a:srgbClr val="808080"/>
-                </a:solidFill>
-                <a:latin typeface="Consolas" panose="020B0609020204030204" pitchFamily="49" charset="0"/>
-              </a:rPr>
-              <a:t>///</a:t>
-            </a:r>
-            <a:r>
-              <a:rPr lang="en-US" dirty="0">
-                <a:solidFill>
-                  <a:srgbClr val="008000"/>
-                </a:solidFill>
-                <a:latin typeface="Consolas" panose="020B0609020204030204" pitchFamily="49" charset="0"/>
-              </a:rPr>
-              <a:t> </a:t>
-            </a:r>
-            <a:r>
-              <a:rPr lang="en-US" dirty="0">
-                <a:solidFill>
-                  <a:srgbClr val="808080"/>
-                </a:solidFill>
-                <a:latin typeface="Consolas" panose="020B0609020204030204" pitchFamily="49" charset="0"/>
-              </a:rPr>
-              <a:t>&lt;summary&gt;</a:t>
-            </a:r>
-            <a:br>
-              <a:rPr lang="en-US" dirty="0">
-                <a:solidFill>
-                  <a:srgbClr val="808080"/>
-                </a:solidFill>
-                <a:latin typeface="Consolas" panose="020B0609020204030204" pitchFamily="49" charset="0"/>
-              </a:rPr>
-            </a:br>
-            <a:r>
-              <a:rPr lang="en-US" dirty="0">
-                <a:solidFill>
-                  <a:srgbClr val="000000"/>
-                </a:solidFill>
-                <a:latin typeface="Consolas" panose="020B0609020204030204" pitchFamily="49" charset="0"/>
-              </a:rPr>
-              <a:t>        </a:t>
-            </a:r>
-            <a:r>
-              <a:rPr lang="en-US" dirty="0">
-                <a:solidFill>
-                  <a:srgbClr val="808080"/>
-                </a:solidFill>
-                <a:latin typeface="Consolas" panose="020B0609020204030204" pitchFamily="49" charset="0"/>
-              </a:rPr>
-              <a:t>///</a:t>
-            </a:r>
-            <a:r>
-              <a:rPr lang="en-US" dirty="0">
-                <a:solidFill>
-                  <a:srgbClr val="008000"/>
-                </a:solidFill>
-                <a:latin typeface="Consolas" panose="020B0609020204030204" pitchFamily="49" charset="0"/>
-              </a:rPr>
-              <a:t> Perform some asynchronous work to analyze the item and produce some opaque state.</a:t>
-            </a:r>
-            <a:br>
-              <a:rPr lang="en-US" dirty="0">
-                <a:solidFill>
-                  <a:srgbClr val="008000"/>
-                </a:solidFill>
-                <a:latin typeface="Consolas" panose="020B0609020204030204" pitchFamily="49" charset="0"/>
-              </a:rPr>
-            </a:br>
-            <a:r>
-              <a:rPr lang="en-US" dirty="0">
-                <a:solidFill>
-                  <a:srgbClr val="000000"/>
-                </a:solidFill>
-                <a:latin typeface="Consolas" panose="020B0609020204030204" pitchFamily="49" charset="0"/>
-              </a:rPr>
-              <a:t>        </a:t>
-            </a:r>
-            <a:r>
-              <a:rPr lang="en-US" dirty="0">
-                <a:solidFill>
-                  <a:srgbClr val="808080"/>
-                </a:solidFill>
-                <a:latin typeface="Consolas" panose="020B0609020204030204" pitchFamily="49" charset="0"/>
-              </a:rPr>
-              <a:t>///</a:t>
-            </a:r>
-            <a:r>
-              <a:rPr lang="en-US" dirty="0">
-                <a:solidFill>
-                  <a:srgbClr val="008000"/>
-                </a:solidFill>
-                <a:latin typeface="Consolas" panose="020B0609020204030204" pitchFamily="49" charset="0"/>
-              </a:rPr>
-              <a:t> </a:t>
-            </a:r>
-            <a:r>
-              <a:rPr lang="en-US" dirty="0">
-                <a:solidFill>
-                  <a:srgbClr val="808080"/>
-                </a:solidFill>
-                <a:latin typeface="Consolas" panose="020B0609020204030204" pitchFamily="49" charset="0"/>
-              </a:rPr>
-              <a:t>&lt;/summary&gt;</a:t>
-            </a:r>
-            <a:br>
-              <a:rPr lang="en-US" dirty="0">
-                <a:solidFill>
-                  <a:srgbClr val="808080"/>
-                </a:solidFill>
-                <a:latin typeface="Consolas" panose="020B0609020204030204" pitchFamily="49" charset="0"/>
-              </a:rPr>
-            </a:br>
-            <a:r>
-              <a:rPr lang="en-US" dirty="0">
-                <a:solidFill>
-                  <a:srgbClr val="000000"/>
-                </a:solidFill>
-                <a:latin typeface="Consolas" panose="020B0609020204030204" pitchFamily="49" charset="0"/>
-              </a:rPr>
-              <a:t>        </a:t>
-            </a:r>
-            <a:r>
-              <a:rPr lang="en-US" dirty="0">
-                <a:solidFill>
-                  <a:srgbClr val="2B91AF"/>
-                </a:solidFill>
-                <a:latin typeface="Consolas" panose="020B0609020204030204" pitchFamily="49" charset="0"/>
-              </a:rPr>
-              <a:t>Task</a:t>
-            </a:r>
-            <a:r>
-              <a:rPr lang="en-US" dirty="0">
-                <a:solidFill>
-                  <a:srgbClr val="000000"/>
-                </a:solidFill>
-                <a:latin typeface="Consolas" panose="020B0609020204030204" pitchFamily="49" charset="0"/>
-              </a:rPr>
-              <a:t>&lt;</a:t>
-            </a:r>
-            <a:r>
-              <a:rPr lang="en-US" dirty="0">
-                <a:solidFill>
-                  <a:srgbClr val="0000FF"/>
-                </a:solidFill>
-                <a:latin typeface="Consolas" panose="020B0609020204030204" pitchFamily="49" charset="0"/>
-              </a:rPr>
-              <a:t>object</a:t>
-            </a:r>
-            <a:r>
-              <a:rPr lang="en-US" dirty="0">
-                <a:solidFill>
-                  <a:srgbClr val="000000"/>
-                </a:solidFill>
-                <a:latin typeface="Consolas" panose="020B0609020204030204" pitchFamily="49" charset="0"/>
-              </a:rPr>
-              <a:t>&gt; </a:t>
-            </a:r>
-            <a:r>
-              <a:rPr lang="en-US" dirty="0" err="1">
-                <a:solidFill>
-                  <a:srgbClr val="000000"/>
-                </a:solidFill>
-                <a:latin typeface="Consolas" panose="020B0609020204030204" pitchFamily="49" charset="0"/>
-              </a:rPr>
-              <a:t>PrepareAsync</a:t>
-            </a:r>
-            <a:r>
-              <a:rPr lang="en-US" dirty="0">
-                <a:solidFill>
-                  <a:srgbClr val="000000"/>
-                </a:solidFill>
-                <a:latin typeface="Consolas" panose="020B0609020204030204" pitchFamily="49" charset="0"/>
-              </a:rPr>
-              <a:t>(</a:t>
-            </a:r>
-            <a:r>
-              <a:rPr lang="en-US" dirty="0">
-                <a:solidFill>
-                  <a:srgbClr val="2B91AF"/>
-                </a:solidFill>
-                <a:latin typeface="Consolas" panose="020B0609020204030204" pitchFamily="49" charset="0"/>
-              </a:rPr>
-              <a:t>Item</a:t>
-            </a:r>
-            <a:r>
-              <a:rPr lang="en-US" dirty="0">
-                <a:solidFill>
-                  <a:srgbClr val="000000"/>
-                </a:solidFill>
-                <a:latin typeface="Consolas" panose="020B0609020204030204" pitchFamily="49" charset="0"/>
-              </a:rPr>
-              <a:t> </a:t>
-            </a:r>
-            <a:r>
-              <a:rPr lang="en-US" dirty="0" err="1">
-                <a:solidFill>
-                  <a:srgbClr val="000000"/>
-                </a:solidFill>
-                <a:latin typeface="Consolas" panose="020B0609020204030204" pitchFamily="49" charset="0"/>
-              </a:rPr>
-              <a:t>item</a:t>
-            </a:r>
-            <a:r>
-              <a:rPr lang="en-US" dirty="0">
-                <a:solidFill>
-                  <a:srgbClr val="000000"/>
-                </a:solidFill>
-                <a:latin typeface="Consolas" panose="020B0609020204030204" pitchFamily="49" charset="0"/>
-              </a:rPr>
-              <a:t>, </a:t>
-            </a:r>
-            <a:r>
-              <a:rPr lang="en-US" dirty="0" err="1">
-                <a:solidFill>
-                  <a:srgbClr val="2B91AF"/>
-                </a:solidFill>
-                <a:latin typeface="Consolas" panose="020B0609020204030204" pitchFamily="49" charset="0"/>
-              </a:rPr>
-              <a:t>CancellationToken</a:t>
-            </a:r>
-            <a:r>
-              <a:rPr lang="en-US" dirty="0">
-                <a:solidFill>
-                  <a:srgbClr val="000000"/>
-                </a:solidFill>
-                <a:latin typeface="Consolas" panose="020B0609020204030204" pitchFamily="49" charset="0"/>
-              </a:rPr>
-              <a:t> token);</a:t>
-            </a:r>
-            <a:br>
-              <a:rPr lang="en-US" dirty="0">
-                <a:solidFill>
-                  <a:srgbClr val="000000"/>
-                </a:solidFill>
-                <a:latin typeface="Consolas" panose="020B0609020204030204" pitchFamily="49" charset="0"/>
-              </a:rPr>
-            </a:br>
-            <a:br>
-              <a:rPr lang="en-US" dirty="0">
-                <a:solidFill>
-                  <a:srgbClr val="000000"/>
-                </a:solidFill>
-                <a:latin typeface="Consolas" panose="020B0609020204030204" pitchFamily="49" charset="0"/>
-              </a:rPr>
-            </a:br>
-            <a:r>
-              <a:rPr lang="en-US" dirty="0">
-                <a:solidFill>
-                  <a:srgbClr val="000000"/>
-                </a:solidFill>
-                <a:latin typeface="Consolas" panose="020B0609020204030204" pitchFamily="49" charset="0"/>
-              </a:rPr>
-              <a:t>        </a:t>
-            </a:r>
-            <a:r>
-              <a:rPr lang="en-US" dirty="0">
-                <a:solidFill>
-                  <a:srgbClr val="808080"/>
-                </a:solidFill>
-                <a:latin typeface="Consolas" panose="020B0609020204030204" pitchFamily="49" charset="0"/>
-              </a:rPr>
-              <a:t>///</a:t>
-            </a:r>
-            <a:r>
-              <a:rPr lang="en-US" dirty="0">
-                <a:solidFill>
-                  <a:srgbClr val="008000"/>
-                </a:solidFill>
-                <a:latin typeface="Consolas" panose="020B0609020204030204" pitchFamily="49" charset="0"/>
-              </a:rPr>
-              <a:t> </a:t>
-            </a:r>
-            <a:r>
-              <a:rPr lang="en-US" dirty="0">
-                <a:solidFill>
-                  <a:srgbClr val="808080"/>
-                </a:solidFill>
-                <a:latin typeface="Consolas" panose="020B0609020204030204" pitchFamily="49" charset="0"/>
-              </a:rPr>
-              <a:t>&lt;summary&gt;</a:t>
-            </a:r>
-            <a:br>
-              <a:rPr lang="en-US" dirty="0">
-                <a:solidFill>
-                  <a:srgbClr val="808080"/>
-                </a:solidFill>
-                <a:latin typeface="Consolas" panose="020B0609020204030204" pitchFamily="49" charset="0"/>
-              </a:rPr>
-            </a:br>
-            <a:r>
-              <a:rPr lang="en-US" dirty="0">
-                <a:solidFill>
-                  <a:srgbClr val="000000"/>
-                </a:solidFill>
-                <a:latin typeface="Consolas" panose="020B0609020204030204" pitchFamily="49" charset="0"/>
-              </a:rPr>
-              <a:t>        </a:t>
-            </a:r>
-            <a:r>
-              <a:rPr lang="en-US" dirty="0">
-                <a:solidFill>
-                  <a:srgbClr val="808080"/>
-                </a:solidFill>
-                <a:latin typeface="Consolas" panose="020B0609020204030204" pitchFamily="49" charset="0"/>
-              </a:rPr>
-              <a:t>///</a:t>
-            </a:r>
-            <a:r>
-              <a:rPr lang="en-US" dirty="0">
-                <a:solidFill>
-                  <a:srgbClr val="008000"/>
-                </a:solidFill>
-                <a:latin typeface="Consolas" panose="020B0609020204030204" pitchFamily="49" charset="0"/>
-              </a:rPr>
-              <a:t> Returns whether this scorable wants to participate in scoring this item.</a:t>
-            </a:r>
-            <a:br>
-              <a:rPr lang="en-US" dirty="0">
-                <a:solidFill>
-                  <a:srgbClr val="008000"/>
-                </a:solidFill>
-                <a:latin typeface="Consolas" panose="020B0609020204030204" pitchFamily="49" charset="0"/>
-              </a:rPr>
-            </a:br>
-            <a:r>
-              <a:rPr lang="en-US" dirty="0">
-                <a:solidFill>
-                  <a:srgbClr val="000000"/>
-                </a:solidFill>
-                <a:latin typeface="Consolas" panose="020B0609020204030204" pitchFamily="49" charset="0"/>
-              </a:rPr>
-              <a:t>        </a:t>
-            </a:r>
-            <a:r>
-              <a:rPr lang="en-US" dirty="0">
-                <a:solidFill>
-                  <a:srgbClr val="808080"/>
-                </a:solidFill>
-                <a:latin typeface="Consolas" panose="020B0609020204030204" pitchFamily="49" charset="0"/>
-              </a:rPr>
-              <a:t>///</a:t>
-            </a:r>
-            <a:r>
-              <a:rPr lang="en-US" dirty="0">
-                <a:solidFill>
-                  <a:srgbClr val="008000"/>
-                </a:solidFill>
-                <a:latin typeface="Consolas" panose="020B0609020204030204" pitchFamily="49" charset="0"/>
-              </a:rPr>
-              <a:t> </a:t>
-            </a:r>
-            <a:r>
-              <a:rPr lang="en-US" dirty="0">
-                <a:solidFill>
-                  <a:srgbClr val="808080"/>
-                </a:solidFill>
-                <a:latin typeface="Consolas" panose="020B0609020204030204" pitchFamily="49" charset="0"/>
-              </a:rPr>
-              <a:t>&lt;/summary&gt;</a:t>
-            </a:r>
-            <a:br>
-              <a:rPr lang="en-US" dirty="0">
-                <a:solidFill>
-                  <a:srgbClr val="808080"/>
-                </a:solidFill>
-                <a:latin typeface="Consolas" panose="020B0609020204030204" pitchFamily="49" charset="0"/>
-              </a:rPr>
-            </a:br>
-            <a:r>
-              <a:rPr lang="en-US" dirty="0">
-                <a:solidFill>
-                  <a:srgbClr val="000000"/>
-                </a:solidFill>
-                <a:latin typeface="Consolas" panose="020B0609020204030204" pitchFamily="49" charset="0"/>
-              </a:rPr>
-              <a:t>        </a:t>
-            </a:r>
-            <a:r>
-              <a:rPr lang="en-US" dirty="0">
-                <a:solidFill>
-                  <a:srgbClr val="0000FF"/>
-                </a:solidFill>
-                <a:latin typeface="Consolas" panose="020B0609020204030204" pitchFamily="49" charset="0"/>
-              </a:rPr>
-              <a:t>bool</a:t>
-            </a:r>
-            <a:r>
-              <a:rPr lang="en-US" dirty="0">
-                <a:solidFill>
-                  <a:srgbClr val="000000"/>
-                </a:solidFill>
-                <a:latin typeface="Consolas" panose="020B0609020204030204" pitchFamily="49" charset="0"/>
-              </a:rPr>
-              <a:t> </a:t>
-            </a:r>
-            <a:r>
-              <a:rPr lang="en-US" dirty="0" err="1">
-                <a:solidFill>
-                  <a:srgbClr val="000000"/>
-                </a:solidFill>
-                <a:latin typeface="Consolas" panose="020B0609020204030204" pitchFamily="49" charset="0"/>
-              </a:rPr>
-              <a:t>HasScore</a:t>
-            </a:r>
-            <a:r>
-              <a:rPr lang="en-US" dirty="0">
-                <a:solidFill>
-                  <a:srgbClr val="000000"/>
-                </a:solidFill>
-                <a:latin typeface="Consolas" panose="020B0609020204030204" pitchFamily="49" charset="0"/>
-              </a:rPr>
-              <a:t>(</a:t>
-            </a:r>
-            <a:r>
-              <a:rPr lang="en-US" dirty="0">
-                <a:solidFill>
-                  <a:srgbClr val="2B91AF"/>
-                </a:solidFill>
-                <a:latin typeface="Consolas" panose="020B0609020204030204" pitchFamily="49" charset="0"/>
-              </a:rPr>
-              <a:t>Item</a:t>
-            </a:r>
-            <a:r>
-              <a:rPr lang="en-US" dirty="0">
-                <a:solidFill>
-                  <a:srgbClr val="000000"/>
-                </a:solidFill>
-                <a:latin typeface="Consolas" panose="020B0609020204030204" pitchFamily="49" charset="0"/>
-              </a:rPr>
-              <a:t> </a:t>
-            </a:r>
-            <a:r>
-              <a:rPr lang="en-US" dirty="0" err="1">
-                <a:solidFill>
-                  <a:srgbClr val="000000"/>
-                </a:solidFill>
-                <a:latin typeface="Consolas" panose="020B0609020204030204" pitchFamily="49" charset="0"/>
-              </a:rPr>
-              <a:t>item</a:t>
-            </a:r>
-            <a:r>
-              <a:rPr lang="en-US" dirty="0">
-                <a:solidFill>
-                  <a:srgbClr val="000000"/>
-                </a:solidFill>
-                <a:latin typeface="Consolas" panose="020B0609020204030204" pitchFamily="49" charset="0"/>
-              </a:rPr>
-              <a:t>, </a:t>
-            </a:r>
-            <a:r>
-              <a:rPr lang="en-US" dirty="0">
-                <a:solidFill>
-                  <a:srgbClr val="0000FF"/>
-                </a:solidFill>
-                <a:latin typeface="Consolas" panose="020B0609020204030204" pitchFamily="49" charset="0"/>
-              </a:rPr>
-              <a:t>object</a:t>
-            </a:r>
-            <a:r>
-              <a:rPr lang="en-US" dirty="0">
-                <a:solidFill>
-                  <a:srgbClr val="000000"/>
-                </a:solidFill>
-                <a:latin typeface="Consolas" panose="020B0609020204030204" pitchFamily="49" charset="0"/>
-              </a:rPr>
-              <a:t> state);</a:t>
-            </a:r>
-            <a:br>
-              <a:rPr lang="en-US" dirty="0">
-                <a:solidFill>
-                  <a:srgbClr val="000000"/>
-                </a:solidFill>
-                <a:latin typeface="Consolas" panose="020B0609020204030204" pitchFamily="49" charset="0"/>
-              </a:rPr>
-            </a:br>
-            <a:br>
-              <a:rPr lang="en-US" dirty="0">
-                <a:solidFill>
-                  <a:srgbClr val="000000"/>
-                </a:solidFill>
-                <a:latin typeface="Consolas" panose="020B0609020204030204" pitchFamily="49" charset="0"/>
-              </a:rPr>
-            </a:br>
-            <a:r>
-              <a:rPr lang="en-US" dirty="0">
-                <a:solidFill>
-                  <a:srgbClr val="000000"/>
-                </a:solidFill>
-                <a:latin typeface="Consolas" panose="020B0609020204030204" pitchFamily="49" charset="0"/>
-              </a:rPr>
-              <a:t>        </a:t>
-            </a:r>
-            <a:r>
-              <a:rPr lang="en-US" dirty="0">
-                <a:solidFill>
-                  <a:srgbClr val="808080"/>
-                </a:solidFill>
-                <a:latin typeface="Consolas" panose="020B0609020204030204" pitchFamily="49" charset="0"/>
-              </a:rPr>
-              <a:t>///</a:t>
-            </a:r>
-            <a:r>
-              <a:rPr lang="en-US" dirty="0">
-                <a:solidFill>
-                  <a:srgbClr val="008000"/>
-                </a:solidFill>
-                <a:latin typeface="Consolas" panose="020B0609020204030204" pitchFamily="49" charset="0"/>
-              </a:rPr>
-              <a:t> </a:t>
-            </a:r>
-            <a:r>
-              <a:rPr lang="en-US" dirty="0">
-                <a:solidFill>
-                  <a:srgbClr val="808080"/>
-                </a:solidFill>
-                <a:latin typeface="Consolas" panose="020B0609020204030204" pitchFamily="49" charset="0"/>
-              </a:rPr>
-              <a:t>&lt;summary&gt;</a:t>
-            </a:r>
-            <a:br>
-              <a:rPr lang="en-US" dirty="0">
-                <a:solidFill>
-                  <a:srgbClr val="808080"/>
-                </a:solidFill>
-                <a:latin typeface="Consolas" panose="020B0609020204030204" pitchFamily="49" charset="0"/>
-              </a:rPr>
-            </a:br>
-            <a:r>
-              <a:rPr lang="en-US" dirty="0">
-                <a:solidFill>
-                  <a:srgbClr val="000000"/>
-                </a:solidFill>
-                <a:latin typeface="Consolas" panose="020B0609020204030204" pitchFamily="49" charset="0"/>
-              </a:rPr>
-              <a:t>        </a:t>
-            </a:r>
-            <a:r>
-              <a:rPr lang="en-US" dirty="0">
-                <a:solidFill>
-                  <a:srgbClr val="808080"/>
-                </a:solidFill>
-                <a:latin typeface="Consolas" panose="020B0609020204030204" pitchFamily="49" charset="0"/>
-              </a:rPr>
-              <a:t>///</a:t>
-            </a:r>
-            <a:r>
-              <a:rPr lang="en-US" dirty="0">
-                <a:solidFill>
-                  <a:srgbClr val="008000"/>
-                </a:solidFill>
-                <a:latin typeface="Consolas" panose="020B0609020204030204" pitchFamily="49" charset="0"/>
-              </a:rPr>
-              <a:t> Gets the score for this item.</a:t>
-            </a:r>
-            <a:br>
-              <a:rPr lang="en-US" dirty="0">
-                <a:solidFill>
-                  <a:srgbClr val="008000"/>
-                </a:solidFill>
-                <a:latin typeface="Consolas" panose="020B0609020204030204" pitchFamily="49" charset="0"/>
-              </a:rPr>
-            </a:br>
-            <a:r>
-              <a:rPr lang="en-US" dirty="0">
-                <a:solidFill>
-                  <a:srgbClr val="000000"/>
-                </a:solidFill>
-                <a:latin typeface="Consolas" panose="020B0609020204030204" pitchFamily="49" charset="0"/>
-              </a:rPr>
-              <a:t>        </a:t>
-            </a:r>
-            <a:r>
-              <a:rPr lang="en-US" dirty="0">
-                <a:solidFill>
-                  <a:srgbClr val="808080"/>
-                </a:solidFill>
-                <a:latin typeface="Consolas" panose="020B0609020204030204" pitchFamily="49" charset="0"/>
-              </a:rPr>
-              <a:t>///</a:t>
-            </a:r>
-            <a:r>
-              <a:rPr lang="en-US" dirty="0">
-                <a:solidFill>
-                  <a:srgbClr val="008000"/>
-                </a:solidFill>
-                <a:latin typeface="Consolas" panose="020B0609020204030204" pitchFamily="49" charset="0"/>
-              </a:rPr>
-              <a:t> </a:t>
-            </a:r>
-            <a:r>
-              <a:rPr lang="en-US" dirty="0">
-                <a:solidFill>
-                  <a:srgbClr val="808080"/>
-                </a:solidFill>
-                <a:latin typeface="Consolas" panose="020B0609020204030204" pitchFamily="49" charset="0"/>
-              </a:rPr>
-              <a:t>&lt;/summary&gt;</a:t>
-            </a:r>
-            <a:br>
-              <a:rPr lang="en-US" dirty="0">
-                <a:solidFill>
-                  <a:srgbClr val="808080"/>
-                </a:solidFill>
-                <a:latin typeface="Consolas" panose="020B0609020204030204" pitchFamily="49" charset="0"/>
-              </a:rPr>
-            </a:br>
-            <a:r>
-              <a:rPr lang="en-US" dirty="0">
-                <a:solidFill>
-                  <a:srgbClr val="000000"/>
-                </a:solidFill>
-                <a:latin typeface="Consolas" panose="020B0609020204030204" pitchFamily="49" charset="0"/>
-              </a:rPr>
-              <a:t>        </a:t>
-            </a:r>
-            <a:r>
-              <a:rPr lang="en-US" dirty="0">
-                <a:solidFill>
-                  <a:srgbClr val="2B91AF"/>
-                </a:solidFill>
-                <a:latin typeface="Consolas" panose="020B0609020204030204" pitchFamily="49" charset="0"/>
-              </a:rPr>
-              <a:t>Score</a:t>
-            </a:r>
-            <a:r>
-              <a:rPr lang="en-US" dirty="0">
-                <a:solidFill>
-                  <a:srgbClr val="000000"/>
-                </a:solidFill>
-                <a:latin typeface="Consolas" panose="020B0609020204030204" pitchFamily="49" charset="0"/>
-              </a:rPr>
-              <a:t> </a:t>
-            </a:r>
-            <a:r>
-              <a:rPr lang="en-US" dirty="0" err="1">
-                <a:solidFill>
-                  <a:srgbClr val="000000"/>
-                </a:solidFill>
-                <a:latin typeface="Consolas" panose="020B0609020204030204" pitchFamily="49" charset="0"/>
-              </a:rPr>
-              <a:t>GetScore</a:t>
-            </a:r>
-            <a:r>
-              <a:rPr lang="en-US" dirty="0">
-                <a:solidFill>
-                  <a:srgbClr val="000000"/>
-                </a:solidFill>
-                <a:latin typeface="Consolas" panose="020B0609020204030204" pitchFamily="49" charset="0"/>
-              </a:rPr>
-              <a:t>(</a:t>
-            </a:r>
-            <a:r>
-              <a:rPr lang="en-US" dirty="0">
-                <a:solidFill>
-                  <a:srgbClr val="2B91AF"/>
-                </a:solidFill>
-                <a:latin typeface="Consolas" panose="020B0609020204030204" pitchFamily="49" charset="0"/>
-              </a:rPr>
-              <a:t>Item</a:t>
-            </a:r>
-            <a:r>
-              <a:rPr lang="en-US" dirty="0">
-                <a:solidFill>
-                  <a:srgbClr val="000000"/>
-                </a:solidFill>
-                <a:latin typeface="Consolas" panose="020B0609020204030204" pitchFamily="49" charset="0"/>
-              </a:rPr>
-              <a:t> </a:t>
-            </a:r>
-            <a:r>
-              <a:rPr lang="en-US" dirty="0" err="1">
-                <a:solidFill>
-                  <a:srgbClr val="000000"/>
-                </a:solidFill>
-                <a:latin typeface="Consolas" panose="020B0609020204030204" pitchFamily="49" charset="0"/>
-              </a:rPr>
-              <a:t>item</a:t>
-            </a:r>
-            <a:r>
-              <a:rPr lang="en-US" dirty="0">
-                <a:solidFill>
-                  <a:srgbClr val="000000"/>
-                </a:solidFill>
-                <a:latin typeface="Consolas" panose="020B0609020204030204" pitchFamily="49" charset="0"/>
-              </a:rPr>
-              <a:t>, </a:t>
-            </a:r>
-            <a:r>
-              <a:rPr lang="en-US" dirty="0">
-                <a:solidFill>
-                  <a:srgbClr val="0000FF"/>
-                </a:solidFill>
-                <a:latin typeface="Consolas" panose="020B0609020204030204" pitchFamily="49" charset="0"/>
-              </a:rPr>
-              <a:t>object</a:t>
-            </a:r>
-            <a:r>
-              <a:rPr lang="en-US" dirty="0">
-                <a:solidFill>
-                  <a:srgbClr val="000000"/>
-                </a:solidFill>
-                <a:latin typeface="Consolas" panose="020B0609020204030204" pitchFamily="49" charset="0"/>
-              </a:rPr>
-              <a:t> state);</a:t>
-            </a:r>
-            <a:br>
-              <a:rPr lang="en-US" dirty="0">
-                <a:solidFill>
-                  <a:srgbClr val="000000"/>
-                </a:solidFill>
-                <a:latin typeface="Consolas" panose="020B0609020204030204" pitchFamily="49" charset="0"/>
-              </a:rPr>
-            </a:br>
-            <a:br>
-              <a:rPr lang="en-US" dirty="0">
-                <a:solidFill>
-                  <a:srgbClr val="000000"/>
-                </a:solidFill>
-                <a:latin typeface="Consolas" panose="020B0609020204030204" pitchFamily="49" charset="0"/>
-              </a:rPr>
-            </a:br>
-            <a:r>
-              <a:rPr lang="en-US" dirty="0">
-                <a:solidFill>
-                  <a:srgbClr val="000000"/>
-                </a:solidFill>
-                <a:latin typeface="Consolas" panose="020B0609020204030204" pitchFamily="49" charset="0"/>
-              </a:rPr>
-              <a:t>        </a:t>
-            </a:r>
-            <a:r>
-              <a:rPr lang="en-US" dirty="0">
-                <a:solidFill>
-                  <a:srgbClr val="808080"/>
-                </a:solidFill>
-                <a:latin typeface="Consolas" panose="020B0609020204030204" pitchFamily="49" charset="0"/>
-              </a:rPr>
-              <a:t>///</a:t>
-            </a:r>
-            <a:r>
-              <a:rPr lang="en-US" dirty="0">
-                <a:solidFill>
-                  <a:srgbClr val="008000"/>
-                </a:solidFill>
-                <a:latin typeface="Consolas" panose="020B0609020204030204" pitchFamily="49" charset="0"/>
-              </a:rPr>
-              <a:t> </a:t>
-            </a:r>
-            <a:r>
-              <a:rPr lang="en-US" dirty="0">
-                <a:solidFill>
-                  <a:srgbClr val="808080"/>
-                </a:solidFill>
-                <a:latin typeface="Consolas" panose="020B0609020204030204" pitchFamily="49" charset="0"/>
-              </a:rPr>
-              <a:t>&lt;summary&gt;</a:t>
-            </a:r>
-            <a:br>
-              <a:rPr lang="en-US" dirty="0">
-                <a:solidFill>
-                  <a:srgbClr val="808080"/>
-                </a:solidFill>
-                <a:latin typeface="Consolas" panose="020B0609020204030204" pitchFamily="49" charset="0"/>
-              </a:rPr>
-            </a:br>
-            <a:r>
-              <a:rPr lang="en-US" dirty="0">
-                <a:solidFill>
-                  <a:srgbClr val="000000"/>
-                </a:solidFill>
-                <a:latin typeface="Consolas" panose="020B0609020204030204" pitchFamily="49" charset="0"/>
-              </a:rPr>
-              <a:t>        </a:t>
-            </a:r>
-            <a:r>
-              <a:rPr lang="en-US" dirty="0">
-                <a:solidFill>
-                  <a:srgbClr val="808080"/>
-                </a:solidFill>
-                <a:latin typeface="Consolas" panose="020B0609020204030204" pitchFamily="49" charset="0"/>
-              </a:rPr>
-              <a:t>///</a:t>
-            </a:r>
-            <a:r>
-              <a:rPr lang="en-US" dirty="0">
-                <a:solidFill>
-                  <a:srgbClr val="008000"/>
-                </a:solidFill>
-                <a:latin typeface="Consolas" panose="020B0609020204030204" pitchFamily="49" charset="0"/>
-              </a:rPr>
-              <a:t> If this scorable wins, this method is called.</a:t>
-            </a:r>
-            <a:br>
-              <a:rPr lang="en-US" dirty="0">
-                <a:solidFill>
-                  <a:srgbClr val="008000"/>
-                </a:solidFill>
-                <a:latin typeface="Consolas" panose="020B0609020204030204" pitchFamily="49" charset="0"/>
-              </a:rPr>
-            </a:br>
-            <a:r>
-              <a:rPr lang="en-US" dirty="0">
-                <a:solidFill>
-                  <a:srgbClr val="000000"/>
-                </a:solidFill>
-                <a:latin typeface="Consolas" panose="020B0609020204030204" pitchFamily="49" charset="0"/>
-              </a:rPr>
-              <a:t>        </a:t>
-            </a:r>
-            <a:r>
-              <a:rPr lang="en-US" dirty="0">
-                <a:solidFill>
-                  <a:srgbClr val="808080"/>
-                </a:solidFill>
-                <a:latin typeface="Consolas" panose="020B0609020204030204" pitchFamily="49" charset="0"/>
-              </a:rPr>
-              <a:t>///</a:t>
-            </a:r>
-            <a:r>
-              <a:rPr lang="en-US" dirty="0">
-                <a:solidFill>
-                  <a:srgbClr val="008000"/>
-                </a:solidFill>
-                <a:latin typeface="Consolas" panose="020B0609020204030204" pitchFamily="49" charset="0"/>
-              </a:rPr>
-              <a:t> </a:t>
-            </a:r>
-            <a:r>
-              <a:rPr lang="en-US" dirty="0">
-                <a:solidFill>
-                  <a:srgbClr val="808080"/>
-                </a:solidFill>
-                <a:latin typeface="Consolas" panose="020B0609020204030204" pitchFamily="49" charset="0"/>
-              </a:rPr>
-              <a:t>&lt;/summary&gt;</a:t>
-            </a:r>
-            <a:br>
-              <a:rPr lang="en-US" dirty="0">
-                <a:solidFill>
-                  <a:srgbClr val="808080"/>
-                </a:solidFill>
-                <a:latin typeface="Consolas" panose="020B0609020204030204" pitchFamily="49" charset="0"/>
-              </a:rPr>
-            </a:br>
-            <a:r>
-              <a:rPr lang="en-US" dirty="0">
-                <a:solidFill>
-                  <a:srgbClr val="000000"/>
-                </a:solidFill>
-                <a:latin typeface="Consolas" panose="020B0609020204030204" pitchFamily="49" charset="0"/>
-              </a:rPr>
-              <a:t>        </a:t>
-            </a:r>
-            <a:r>
-              <a:rPr lang="en-US" dirty="0">
-                <a:solidFill>
-                  <a:srgbClr val="2B91AF"/>
-                </a:solidFill>
-                <a:latin typeface="Consolas" panose="020B0609020204030204" pitchFamily="49" charset="0"/>
-              </a:rPr>
-              <a:t>Task</a:t>
-            </a:r>
-            <a:r>
-              <a:rPr lang="en-US" dirty="0">
-                <a:solidFill>
-                  <a:srgbClr val="000000"/>
-                </a:solidFill>
-                <a:latin typeface="Consolas" panose="020B0609020204030204" pitchFamily="49" charset="0"/>
-              </a:rPr>
-              <a:t> </a:t>
-            </a:r>
-            <a:r>
-              <a:rPr lang="en-US" dirty="0" err="1">
-                <a:solidFill>
-                  <a:srgbClr val="000000"/>
-                </a:solidFill>
-                <a:latin typeface="Consolas" panose="020B0609020204030204" pitchFamily="49" charset="0"/>
-              </a:rPr>
-              <a:t>PostAsync</a:t>
-            </a:r>
-            <a:r>
-              <a:rPr lang="en-US" dirty="0">
-                <a:solidFill>
-                  <a:srgbClr val="000000"/>
-                </a:solidFill>
-                <a:latin typeface="Consolas" panose="020B0609020204030204" pitchFamily="49" charset="0"/>
-              </a:rPr>
-              <a:t>(</a:t>
-            </a:r>
-            <a:r>
-              <a:rPr lang="en-US" dirty="0">
-                <a:solidFill>
-                  <a:srgbClr val="2B91AF"/>
-                </a:solidFill>
-                <a:latin typeface="Consolas" panose="020B0609020204030204" pitchFamily="49" charset="0"/>
-              </a:rPr>
-              <a:t>Item</a:t>
-            </a:r>
-            <a:r>
-              <a:rPr lang="en-US" dirty="0">
-                <a:solidFill>
-                  <a:srgbClr val="000000"/>
-                </a:solidFill>
-                <a:latin typeface="Consolas" panose="020B0609020204030204" pitchFamily="49" charset="0"/>
-              </a:rPr>
-              <a:t> </a:t>
-            </a:r>
-            <a:r>
-              <a:rPr lang="en-US" dirty="0" err="1">
-                <a:solidFill>
-                  <a:srgbClr val="000000"/>
-                </a:solidFill>
-                <a:latin typeface="Consolas" panose="020B0609020204030204" pitchFamily="49" charset="0"/>
-              </a:rPr>
-              <a:t>item</a:t>
-            </a:r>
-            <a:r>
-              <a:rPr lang="en-US" dirty="0">
-                <a:solidFill>
-                  <a:srgbClr val="000000"/>
-                </a:solidFill>
-                <a:latin typeface="Consolas" panose="020B0609020204030204" pitchFamily="49" charset="0"/>
-              </a:rPr>
-              <a:t>, </a:t>
-            </a:r>
-            <a:r>
-              <a:rPr lang="en-US" dirty="0">
-                <a:solidFill>
-                  <a:srgbClr val="0000FF"/>
-                </a:solidFill>
-                <a:latin typeface="Consolas" panose="020B0609020204030204" pitchFamily="49" charset="0"/>
-              </a:rPr>
-              <a:t>object</a:t>
-            </a:r>
-            <a:r>
-              <a:rPr lang="en-US" dirty="0">
-                <a:solidFill>
-                  <a:srgbClr val="000000"/>
-                </a:solidFill>
-                <a:latin typeface="Consolas" panose="020B0609020204030204" pitchFamily="49" charset="0"/>
-              </a:rPr>
-              <a:t> state, </a:t>
-            </a:r>
-            <a:r>
-              <a:rPr lang="en-US" dirty="0" err="1">
-                <a:solidFill>
-                  <a:srgbClr val="2B91AF"/>
-                </a:solidFill>
-                <a:latin typeface="Consolas" panose="020B0609020204030204" pitchFamily="49" charset="0"/>
-              </a:rPr>
-              <a:t>CancellationToken</a:t>
-            </a:r>
-            <a:r>
-              <a:rPr lang="en-US" dirty="0">
-                <a:solidFill>
-                  <a:srgbClr val="000000"/>
-                </a:solidFill>
-                <a:latin typeface="Consolas" panose="020B0609020204030204" pitchFamily="49" charset="0"/>
-              </a:rPr>
-              <a:t> token);</a:t>
-            </a:r>
-            <a:br>
-              <a:rPr lang="en-US" dirty="0">
-                <a:solidFill>
-                  <a:srgbClr val="000000"/>
-                </a:solidFill>
-                <a:latin typeface="Consolas" panose="020B0609020204030204" pitchFamily="49" charset="0"/>
-              </a:rPr>
-            </a:br>
-            <a:br>
-              <a:rPr lang="en-US" dirty="0">
-                <a:solidFill>
-                  <a:srgbClr val="000000"/>
-                </a:solidFill>
-                <a:latin typeface="Consolas" panose="020B0609020204030204" pitchFamily="49" charset="0"/>
-              </a:rPr>
-            </a:br>
-            <a:r>
-              <a:rPr lang="en-US" dirty="0">
-                <a:solidFill>
-                  <a:srgbClr val="000000"/>
-                </a:solidFill>
-                <a:latin typeface="Consolas" panose="020B0609020204030204" pitchFamily="49" charset="0"/>
-              </a:rPr>
-              <a:t>        </a:t>
-            </a:r>
-            <a:r>
-              <a:rPr lang="en-US" dirty="0">
-                <a:solidFill>
-                  <a:srgbClr val="808080"/>
-                </a:solidFill>
-                <a:latin typeface="Consolas" panose="020B0609020204030204" pitchFamily="49" charset="0"/>
-              </a:rPr>
-              <a:t>///</a:t>
-            </a:r>
-            <a:r>
-              <a:rPr lang="en-US" dirty="0">
-                <a:solidFill>
-                  <a:srgbClr val="008000"/>
-                </a:solidFill>
-                <a:latin typeface="Consolas" panose="020B0609020204030204" pitchFamily="49" charset="0"/>
-              </a:rPr>
-              <a:t> </a:t>
-            </a:r>
-            <a:r>
-              <a:rPr lang="en-US" dirty="0">
-                <a:solidFill>
-                  <a:srgbClr val="808080"/>
-                </a:solidFill>
-                <a:latin typeface="Consolas" panose="020B0609020204030204" pitchFamily="49" charset="0"/>
-              </a:rPr>
-              <a:t>&lt;summary&gt;</a:t>
-            </a:r>
-            <a:br>
-              <a:rPr lang="en-US" dirty="0">
-                <a:solidFill>
-                  <a:srgbClr val="808080"/>
-                </a:solidFill>
-                <a:latin typeface="Consolas" panose="020B0609020204030204" pitchFamily="49" charset="0"/>
-              </a:rPr>
-            </a:br>
-            <a:r>
-              <a:rPr lang="en-US" dirty="0">
-                <a:solidFill>
-                  <a:srgbClr val="000000"/>
-                </a:solidFill>
-                <a:latin typeface="Consolas" panose="020B0609020204030204" pitchFamily="49" charset="0"/>
-              </a:rPr>
-              <a:t>        </a:t>
-            </a:r>
-            <a:r>
-              <a:rPr lang="en-US" dirty="0">
-                <a:solidFill>
-                  <a:srgbClr val="808080"/>
-                </a:solidFill>
-                <a:latin typeface="Consolas" panose="020B0609020204030204" pitchFamily="49" charset="0"/>
-              </a:rPr>
-              <a:t>///</a:t>
-            </a:r>
-            <a:r>
-              <a:rPr lang="en-US" dirty="0">
-                <a:solidFill>
-                  <a:srgbClr val="008000"/>
-                </a:solidFill>
-                <a:latin typeface="Consolas" panose="020B0609020204030204" pitchFamily="49" charset="0"/>
-              </a:rPr>
-              <a:t> The scoring process has completed - dispose of any scoped resources.</a:t>
-            </a:r>
-            <a:br>
-              <a:rPr lang="en-US" dirty="0">
-                <a:solidFill>
-                  <a:srgbClr val="008000"/>
-                </a:solidFill>
-                <a:latin typeface="Consolas" panose="020B0609020204030204" pitchFamily="49" charset="0"/>
-              </a:rPr>
-            </a:br>
-            <a:r>
-              <a:rPr lang="en-US" dirty="0">
-                <a:solidFill>
-                  <a:srgbClr val="000000"/>
-                </a:solidFill>
-                <a:latin typeface="Consolas" panose="020B0609020204030204" pitchFamily="49" charset="0"/>
-              </a:rPr>
-              <a:t>        </a:t>
-            </a:r>
-            <a:r>
-              <a:rPr lang="en-US" dirty="0">
-                <a:solidFill>
-                  <a:srgbClr val="808080"/>
-                </a:solidFill>
-                <a:latin typeface="Consolas" panose="020B0609020204030204" pitchFamily="49" charset="0"/>
-              </a:rPr>
-              <a:t>///</a:t>
-            </a:r>
-            <a:r>
-              <a:rPr lang="en-US" dirty="0">
-                <a:solidFill>
-                  <a:srgbClr val="008000"/>
-                </a:solidFill>
-                <a:latin typeface="Consolas" panose="020B0609020204030204" pitchFamily="49" charset="0"/>
-              </a:rPr>
-              <a:t> </a:t>
-            </a:r>
-            <a:r>
-              <a:rPr lang="en-US" dirty="0">
-                <a:solidFill>
-                  <a:srgbClr val="808080"/>
-                </a:solidFill>
-                <a:latin typeface="Consolas" panose="020B0609020204030204" pitchFamily="49" charset="0"/>
-              </a:rPr>
-              <a:t>&lt;/summary&gt;</a:t>
-            </a:r>
-            <a:br>
-              <a:rPr lang="en-US" dirty="0">
-                <a:solidFill>
-                  <a:srgbClr val="808080"/>
-                </a:solidFill>
-                <a:latin typeface="Consolas" panose="020B0609020204030204" pitchFamily="49" charset="0"/>
-              </a:rPr>
-            </a:br>
-            <a:r>
-              <a:rPr lang="en-US" dirty="0">
-                <a:solidFill>
-                  <a:srgbClr val="000000"/>
-                </a:solidFill>
-                <a:latin typeface="Consolas" panose="020B0609020204030204" pitchFamily="49" charset="0"/>
-              </a:rPr>
-              <a:t>        </a:t>
-            </a:r>
-            <a:r>
-              <a:rPr lang="en-US" dirty="0">
-                <a:solidFill>
-                  <a:srgbClr val="2B91AF"/>
-                </a:solidFill>
-                <a:latin typeface="Consolas" panose="020B0609020204030204" pitchFamily="49" charset="0"/>
-              </a:rPr>
-              <a:t>Task</a:t>
-            </a:r>
-            <a:r>
-              <a:rPr lang="en-US" dirty="0">
-                <a:solidFill>
-                  <a:srgbClr val="000000"/>
-                </a:solidFill>
-                <a:latin typeface="Consolas" panose="020B0609020204030204" pitchFamily="49" charset="0"/>
-              </a:rPr>
-              <a:t> </a:t>
-            </a:r>
-            <a:r>
-              <a:rPr lang="en-US" dirty="0" err="1">
-                <a:solidFill>
-                  <a:srgbClr val="000000"/>
-                </a:solidFill>
-                <a:latin typeface="Consolas" panose="020B0609020204030204" pitchFamily="49" charset="0"/>
-              </a:rPr>
-              <a:t>DoneAsync</a:t>
-            </a:r>
-            <a:r>
-              <a:rPr lang="en-US" dirty="0">
-                <a:solidFill>
-                  <a:srgbClr val="000000"/>
-                </a:solidFill>
-                <a:latin typeface="Consolas" panose="020B0609020204030204" pitchFamily="49" charset="0"/>
-              </a:rPr>
-              <a:t>(</a:t>
-            </a:r>
-            <a:r>
-              <a:rPr lang="en-US" dirty="0">
-                <a:solidFill>
-                  <a:srgbClr val="2B91AF"/>
-                </a:solidFill>
-                <a:latin typeface="Consolas" panose="020B0609020204030204" pitchFamily="49" charset="0"/>
-              </a:rPr>
-              <a:t>Item</a:t>
-            </a:r>
-            <a:r>
-              <a:rPr lang="en-US" dirty="0">
-                <a:solidFill>
-                  <a:srgbClr val="000000"/>
-                </a:solidFill>
-                <a:latin typeface="Consolas" panose="020B0609020204030204" pitchFamily="49" charset="0"/>
-              </a:rPr>
-              <a:t> </a:t>
-            </a:r>
-            <a:r>
-              <a:rPr lang="en-US" dirty="0" err="1">
-                <a:solidFill>
-                  <a:srgbClr val="000000"/>
-                </a:solidFill>
-                <a:latin typeface="Consolas" panose="020B0609020204030204" pitchFamily="49" charset="0"/>
-              </a:rPr>
-              <a:t>item</a:t>
-            </a:r>
-            <a:r>
-              <a:rPr lang="en-US" dirty="0">
-                <a:solidFill>
-                  <a:srgbClr val="000000"/>
-                </a:solidFill>
-                <a:latin typeface="Consolas" panose="020B0609020204030204" pitchFamily="49" charset="0"/>
-              </a:rPr>
-              <a:t>, </a:t>
-            </a:r>
-            <a:r>
-              <a:rPr lang="en-US" dirty="0">
-                <a:solidFill>
-                  <a:srgbClr val="0000FF"/>
-                </a:solidFill>
-                <a:latin typeface="Consolas" panose="020B0609020204030204" pitchFamily="49" charset="0"/>
-              </a:rPr>
-              <a:t>object</a:t>
-            </a:r>
-            <a:r>
-              <a:rPr lang="en-US" dirty="0">
-                <a:solidFill>
-                  <a:srgbClr val="000000"/>
-                </a:solidFill>
-                <a:latin typeface="Consolas" panose="020B0609020204030204" pitchFamily="49" charset="0"/>
-              </a:rPr>
-              <a:t> state, </a:t>
-            </a:r>
-            <a:r>
-              <a:rPr lang="en-US" dirty="0" err="1">
-                <a:solidFill>
-                  <a:srgbClr val="2B91AF"/>
-                </a:solidFill>
-                <a:latin typeface="Consolas" panose="020B0609020204030204" pitchFamily="49" charset="0"/>
-              </a:rPr>
-              <a:t>CancellationToken</a:t>
-            </a:r>
-            <a:r>
-              <a:rPr lang="en-US" dirty="0">
-                <a:solidFill>
-                  <a:srgbClr val="000000"/>
-                </a:solidFill>
-                <a:latin typeface="Consolas" panose="020B0609020204030204" pitchFamily="49" charset="0"/>
-              </a:rPr>
-              <a:t> token);</a:t>
-            </a:r>
-            <a:br>
-              <a:rPr lang="en-US" dirty="0">
-                <a:solidFill>
-                  <a:srgbClr val="000000"/>
-                </a:solidFill>
-                <a:latin typeface="Consolas" panose="020B0609020204030204" pitchFamily="49" charset="0"/>
-              </a:rPr>
-            </a:br>
-            <a:r>
-              <a:rPr lang="en-US" dirty="0">
-                <a:solidFill>
-                  <a:srgbClr val="000000"/>
-                </a:solidFill>
-                <a:latin typeface="Consolas" panose="020B0609020204030204" pitchFamily="49" charset="0"/>
-              </a:rPr>
-              <a:t>    }</a:t>
-            </a:r>
+              <a:rPr lang="en-US" dirty="0"/>
+              <a:t>Field Attributes</a:t>
+            </a:r>
+          </a:p>
+          <a:p>
+            <a:r>
+              <a:rPr lang="en-US" dirty="0"/>
+              <a:t>Fields with dynamic content</a:t>
+            </a:r>
+          </a:p>
+          <a:p>
+            <a:r>
+              <a:rPr lang="en-US" dirty="0"/>
+              <a:t>Field validation</a:t>
+            </a:r>
+          </a:p>
+          <a:p>
+            <a:r>
+              <a:rPr lang="en-US" dirty="0"/>
+              <a:t>Confirmation</a:t>
+            </a:r>
+          </a:p>
+          <a:p>
+            <a:r>
+              <a:rPr lang="en-US" dirty="0"/>
+              <a:t>Handling the Quit Message</a:t>
+            </a:r>
+          </a:p>
+          <a:p>
             <a:endParaRPr lang="en-US" dirty="0"/>
           </a:p>
         </p:txBody>
@@ -8560,7 +8029,7 @@
     </p:spTree>
     <p:extLst>
       <p:ext uri="{BB962C8B-B14F-4D97-AF65-F5344CB8AC3E}">
-        <p14:creationId xmlns:p14="http://schemas.microsoft.com/office/powerpoint/2010/main" val="906255408"/>
+        <p14:creationId xmlns:p14="http://schemas.microsoft.com/office/powerpoint/2010/main" val="615238394"/>
       </p:ext>
     </p:extLst>
   </p:cSld>
@@ -8599,15 +8068,14 @@
         </p:nvSpPr>
         <p:spPr/>
         <p:txBody>
-          <a:bodyPr>
-            <a:normAutofit/>
-          </a:bodyPr>
+          <a:bodyPr/>
           <a:lstStyle/>
           <a:p>
             <a:r>
-              <a:rPr lang="en-US" dirty="0"/>
-              <a:t>Natural Language Processing (LUIS)</a:t>
-            </a:r>
+              <a:rPr lang="en-US" dirty="0" err="1"/>
+              <a:t>IScorable</a:t>
+            </a:r>
+            <a:endParaRPr lang="en-US" dirty="0"/>
           </a:p>
         </p:txBody>
       </p:sp>
@@ -8621,99 +8089,1423 @@
             <p:ph idx="1"/>
           </p:nvPr>
         </p:nvSpPr>
-        <p:spPr/>
+        <p:spPr>
+          <a:xfrm>
+            <a:off x="1097280" y="1845733"/>
+            <a:ext cx="10058400" cy="4430827"/>
+          </a:xfrm>
+        </p:spPr>
         <p:txBody>
           <a:bodyPr>
-            <a:normAutofit fontScale="92500" lnSpcReduction="20000"/>
+            <a:normAutofit fontScale="70000" lnSpcReduction="20000"/>
           </a:bodyPr>
           <a:lstStyle/>
           <a:p>
             <a:r>
-              <a:rPr lang="en-US" dirty="0"/>
-              <a:t>Allows the user to type free-form text</a:t>
-            </a:r>
-          </a:p>
-          <a:p>
-            <a:r>
-              <a:rPr lang="en-US" dirty="0"/>
-              <a:t>Define Intents</a:t>
-            </a:r>
-          </a:p>
-          <a:p>
-            <a:pPr lvl="1"/>
-            <a:r>
-              <a:rPr lang="en-US" dirty="0"/>
-              <a:t>Map to dialog methods</a:t>
-            </a:r>
-          </a:p>
-          <a:p>
-            <a:r>
-              <a:rPr lang="en-US" dirty="0"/>
-              <a:t>Define Entities</a:t>
-            </a:r>
-          </a:p>
-          <a:p>
-            <a:pPr lvl="1"/>
-            <a:r>
-              <a:rPr lang="en-US" dirty="0"/>
-              <a:t>Data in the user’s text</a:t>
-            </a:r>
-          </a:p>
-          <a:p>
-            <a:r>
-              <a:rPr lang="en-US" dirty="0"/>
-              <a:t>Add Utterances</a:t>
-            </a:r>
-          </a:p>
-          <a:p>
-            <a:pPr lvl="1"/>
-            <a:r>
-              <a:rPr lang="en-US" dirty="0"/>
-              <a:t>Examples of questions that match intents and contain entities</a:t>
-            </a:r>
-          </a:p>
-          <a:p>
-            <a:r>
-              <a:rPr lang="en-US" dirty="0"/>
-              <a:t>Train and Publish</a:t>
-            </a:r>
-          </a:p>
-          <a:p>
-            <a:pPr lvl="1"/>
-            <a:r>
-              <a:rPr lang="en-US" dirty="0"/>
-              <a:t>Publishing gives keys for the chatbot</a:t>
-            </a:r>
-          </a:p>
-          <a:p>
-            <a:r>
-              <a:rPr lang="en-US" dirty="0"/>
-              <a:t>Add </a:t>
-            </a:r>
-            <a:r>
-              <a:rPr lang="en-US" dirty="0" err="1"/>
-              <a:t>LuisDialog</a:t>
-            </a:r>
-            <a:r>
-              <a:rPr lang="en-US" dirty="0"/>
-              <a:t> to chatbot code </a:t>
-            </a:r>
-          </a:p>
-          <a:p>
-            <a:pPr lvl="1"/>
-            <a:r>
-              <a:rPr lang="en-US" dirty="0"/>
-              <a:t>Attributes for Model and Intents</a:t>
-            </a:r>
-          </a:p>
-          <a:p>
-            <a:pPr lvl="1"/>
-            <a:r>
-              <a:rPr lang="en-US" dirty="0"/>
-              <a:t>Logic to read entities to form response</a:t>
-            </a:r>
-          </a:p>
-          <a:p>
+              <a:rPr lang="en-US" dirty="0">
+                <a:solidFill>
+                  <a:srgbClr val="000000"/>
+                </a:solidFill>
+                <a:latin typeface="Consolas" panose="020B0609020204030204" pitchFamily="49" charset="0"/>
+              </a:rPr>
+              <a:t>    </a:t>
+            </a:r>
+            <a:r>
+              <a:rPr lang="en-US" dirty="0">
+                <a:solidFill>
+                  <a:srgbClr val="0000FF"/>
+                </a:solidFill>
+                <a:latin typeface="Consolas" panose="020B0609020204030204" pitchFamily="49" charset="0"/>
+              </a:rPr>
+              <a:t>public</a:t>
+            </a:r>
+            <a:r>
+              <a:rPr lang="en-US" dirty="0">
+                <a:solidFill>
+                  <a:srgbClr val="000000"/>
+                </a:solidFill>
+                <a:latin typeface="Consolas" panose="020B0609020204030204" pitchFamily="49" charset="0"/>
+              </a:rPr>
+              <a:t> </a:t>
+            </a:r>
+            <a:r>
+              <a:rPr lang="en-US" dirty="0">
+                <a:solidFill>
+                  <a:srgbClr val="0000FF"/>
+                </a:solidFill>
+                <a:latin typeface="Consolas" panose="020B0609020204030204" pitchFamily="49" charset="0"/>
+              </a:rPr>
+              <a:t>interface</a:t>
+            </a:r>
+            <a:r>
+              <a:rPr lang="en-US" dirty="0">
+                <a:solidFill>
+                  <a:srgbClr val="000000"/>
+                </a:solidFill>
+                <a:latin typeface="Consolas" panose="020B0609020204030204" pitchFamily="49" charset="0"/>
+              </a:rPr>
+              <a:t> </a:t>
+            </a:r>
+            <a:r>
+              <a:rPr lang="en-US" dirty="0" err="1">
+                <a:solidFill>
+                  <a:srgbClr val="2B91AF"/>
+                </a:solidFill>
+                <a:latin typeface="Consolas" panose="020B0609020204030204" pitchFamily="49" charset="0"/>
+              </a:rPr>
+              <a:t>IScorable</a:t>
+            </a:r>
+            <a:r>
+              <a:rPr lang="en-US" dirty="0">
+                <a:solidFill>
+                  <a:srgbClr val="000000"/>
+                </a:solidFill>
+                <a:latin typeface="Consolas" panose="020B0609020204030204" pitchFamily="49" charset="0"/>
+              </a:rPr>
+              <a:t>&lt;</a:t>
+            </a:r>
+            <a:r>
+              <a:rPr lang="en-US" dirty="0">
+                <a:solidFill>
+                  <a:srgbClr val="0000FF"/>
+                </a:solidFill>
+                <a:latin typeface="Consolas" panose="020B0609020204030204" pitchFamily="49" charset="0"/>
+              </a:rPr>
+              <a:t>in</a:t>
+            </a:r>
+            <a:r>
+              <a:rPr lang="en-US" dirty="0">
+                <a:solidFill>
+                  <a:srgbClr val="000000"/>
+                </a:solidFill>
+                <a:latin typeface="Consolas" panose="020B0609020204030204" pitchFamily="49" charset="0"/>
+              </a:rPr>
+              <a:t> </a:t>
+            </a:r>
+            <a:r>
+              <a:rPr lang="en-US" dirty="0">
+                <a:solidFill>
+                  <a:srgbClr val="2B91AF"/>
+                </a:solidFill>
+                <a:latin typeface="Consolas" panose="020B0609020204030204" pitchFamily="49" charset="0"/>
+              </a:rPr>
+              <a:t>Item</a:t>
+            </a:r>
+            <a:r>
+              <a:rPr lang="en-US" dirty="0">
+                <a:solidFill>
+                  <a:srgbClr val="000000"/>
+                </a:solidFill>
+                <a:latin typeface="Consolas" panose="020B0609020204030204" pitchFamily="49" charset="0"/>
+              </a:rPr>
+              <a:t>, </a:t>
+            </a:r>
+            <a:r>
+              <a:rPr lang="en-US" dirty="0">
+                <a:solidFill>
+                  <a:srgbClr val="0000FF"/>
+                </a:solidFill>
+                <a:latin typeface="Consolas" panose="020B0609020204030204" pitchFamily="49" charset="0"/>
+              </a:rPr>
+              <a:t>out</a:t>
+            </a:r>
+            <a:r>
+              <a:rPr lang="en-US" dirty="0">
+                <a:solidFill>
+                  <a:srgbClr val="000000"/>
+                </a:solidFill>
+                <a:latin typeface="Consolas" panose="020B0609020204030204" pitchFamily="49" charset="0"/>
+              </a:rPr>
+              <a:t> </a:t>
+            </a:r>
+            <a:r>
+              <a:rPr lang="en-US" dirty="0">
+                <a:solidFill>
+                  <a:srgbClr val="2B91AF"/>
+                </a:solidFill>
+                <a:latin typeface="Consolas" panose="020B0609020204030204" pitchFamily="49" charset="0"/>
+              </a:rPr>
+              <a:t>Score</a:t>
+            </a:r>
+            <a:r>
+              <a:rPr lang="en-US" dirty="0">
+                <a:solidFill>
+                  <a:srgbClr val="000000"/>
+                </a:solidFill>
+                <a:latin typeface="Consolas" panose="020B0609020204030204" pitchFamily="49" charset="0"/>
+              </a:rPr>
+              <a:t>&gt;</a:t>
+            </a:r>
+            <a:br>
+              <a:rPr lang="en-US" dirty="0">
+                <a:solidFill>
+                  <a:srgbClr val="000000"/>
+                </a:solidFill>
+                <a:latin typeface="Consolas" panose="020B0609020204030204" pitchFamily="49" charset="0"/>
+              </a:rPr>
+            </a:br>
+            <a:r>
+              <a:rPr lang="en-US" dirty="0">
+                <a:solidFill>
+                  <a:srgbClr val="000000"/>
+                </a:solidFill>
+                <a:latin typeface="Consolas" panose="020B0609020204030204" pitchFamily="49" charset="0"/>
+              </a:rPr>
+              <a:t>    {</a:t>
+            </a:r>
+            <a:br>
+              <a:rPr lang="en-US" dirty="0">
+                <a:solidFill>
+                  <a:srgbClr val="000000"/>
+                </a:solidFill>
+                <a:latin typeface="Consolas" panose="020B0609020204030204" pitchFamily="49" charset="0"/>
+              </a:rPr>
+            </a:br>
+            <a:r>
+              <a:rPr lang="en-US" dirty="0">
+                <a:solidFill>
+                  <a:srgbClr val="000000"/>
+                </a:solidFill>
+                <a:latin typeface="Consolas" panose="020B0609020204030204" pitchFamily="49" charset="0"/>
+              </a:rPr>
+              <a:t>        </a:t>
+            </a:r>
+            <a:r>
+              <a:rPr lang="en-US" dirty="0">
+                <a:solidFill>
+                  <a:srgbClr val="808080"/>
+                </a:solidFill>
+                <a:latin typeface="Consolas" panose="020B0609020204030204" pitchFamily="49" charset="0"/>
+              </a:rPr>
+              <a:t>///</a:t>
+            </a:r>
+            <a:r>
+              <a:rPr lang="en-US" dirty="0">
+                <a:solidFill>
+                  <a:srgbClr val="008000"/>
+                </a:solidFill>
+                <a:latin typeface="Consolas" panose="020B0609020204030204" pitchFamily="49" charset="0"/>
+              </a:rPr>
+              <a:t> </a:t>
+            </a:r>
+            <a:r>
+              <a:rPr lang="en-US" dirty="0">
+                <a:solidFill>
+                  <a:srgbClr val="808080"/>
+                </a:solidFill>
+                <a:latin typeface="Consolas" panose="020B0609020204030204" pitchFamily="49" charset="0"/>
+              </a:rPr>
+              <a:t>&lt;summary&gt;</a:t>
+            </a:r>
+            <a:br>
+              <a:rPr lang="en-US" dirty="0">
+                <a:solidFill>
+                  <a:srgbClr val="808080"/>
+                </a:solidFill>
+                <a:latin typeface="Consolas" panose="020B0609020204030204" pitchFamily="49" charset="0"/>
+              </a:rPr>
+            </a:br>
+            <a:r>
+              <a:rPr lang="en-US" dirty="0">
+                <a:solidFill>
+                  <a:srgbClr val="000000"/>
+                </a:solidFill>
+                <a:latin typeface="Consolas" panose="020B0609020204030204" pitchFamily="49" charset="0"/>
+              </a:rPr>
+              <a:t>        </a:t>
+            </a:r>
+            <a:r>
+              <a:rPr lang="en-US" dirty="0">
+                <a:solidFill>
+                  <a:srgbClr val="808080"/>
+                </a:solidFill>
+                <a:latin typeface="Consolas" panose="020B0609020204030204" pitchFamily="49" charset="0"/>
+              </a:rPr>
+              <a:t>///</a:t>
+            </a:r>
+            <a:r>
+              <a:rPr lang="en-US" dirty="0">
+                <a:solidFill>
+                  <a:srgbClr val="008000"/>
+                </a:solidFill>
+                <a:latin typeface="Consolas" panose="020B0609020204030204" pitchFamily="49" charset="0"/>
+              </a:rPr>
+              <a:t> Perform some asynchronous work to analyze the item and produce some opaque state.</a:t>
+            </a:r>
+            <a:br>
+              <a:rPr lang="en-US" dirty="0">
+                <a:solidFill>
+                  <a:srgbClr val="008000"/>
+                </a:solidFill>
+                <a:latin typeface="Consolas" panose="020B0609020204030204" pitchFamily="49" charset="0"/>
+              </a:rPr>
+            </a:br>
+            <a:r>
+              <a:rPr lang="en-US" dirty="0">
+                <a:solidFill>
+                  <a:srgbClr val="000000"/>
+                </a:solidFill>
+                <a:latin typeface="Consolas" panose="020B0609020204030204" pitchFamily="49" charset="0"/>
+              </a:rPr>
+              <a:t>        </a:t>
+            </a:r>
+            <a:r>
+              <a:rPr lang="en-US" dirty="0">
+                <a:solidFill>
+                  <a:srgbClr val="808080"/>
+                </a:solidFill>
+                <a:latin typeface="Consolas" panose="020B0609020204030204" pitchFamily="49" charset="0"/>
+              </a:rPr>
+              <a:t>///</a:t>
+            </a:r>
+            <a:r>
+              <a:rPr lang="en-US" dirty="0">
+                <a:solidFill>
+                  <a:srgbClr val="008000"/>
+                </a:solidFill>
+                <a:latin typeface="Consolas" panose="020B0609020204030204" pitchFamily="49" charset="0"/>
+              </a:rPr>
+              <a:t> </a:t>
+            </a:r>
+            <a:r>
+              <a:rPr lang="en-US" dirty="0">
+                <a:solidFill>
+                  <a:srgbClr val="808080"/>
+                </a:solidFill>
+                <a:latin typeface="Consolas" panose="020B0609020204030204" pitchFamily="49" charset="0"/>
+              </a:rPr>
+              <a:t>&lt;/summary&gt;</a:t>
+            </a:r>
+            <a:br>
+              <a:rPr lang="en-US" dirty="0">
+                <a:solidFill>
+                  <a:srgbClr val="808080"/>
+                </a:solidFill>
+                <a:latin typeface="Consolas" panose="020B0609020204030204" pitchFamily="49" charset="0"/>
+              </a:rPr>
+            </a:br>
+            <a:r>
+              <a:rPr lang="en-US" dirty="0">
+                <a:solidFill>
+                  <a:srgbClr val="000000"/>
+                </a:solidFill>
+                <a:latin typeface="Consolas" panose="020B0609020204030204" pitchFamily="49" charset="0"/>
+              </a:rPr>
+              <a:t>        </a:t>
+            </a:r>
+            <a:r>
+              <a:rPr lang="en-US" dirty="0">
+                <a:solidFill>
+                  <a:srgbClr val="2B91AF"/>
+                </a:solidFill>
+                <a:latin typeface="Consolas" panose="020B0609020204030204" pitchFamily="49" charset="0"/>
+              </a:rPr>
+              <a:t>Task</a:t>
+            </a:r>
+            <a:r>
+              <a:rPr lang="en-US" dirty="0">
+                <a:solidFill>
+                  <a:srgbClr val="000000"/>
+                </a:solidFill>
+                <a:latin typeface="Consolas" panose="020B0609020204030204" pitchFamily="49" charset="0"/>
+              </a:rPr>
+              <a:t>&lt;</a:t>
+            </a:r>
+            <a:r>
+              <a:rPr lang="en-US" dirty="0">
+                <a:solidFill>
+                  <a:srgbClr val="0000FF"/>
+                </a:solidFill>
+                <a:latin typeface="Consolas" panose="020B0609020204030204" pitchFamily="49" charset="0"/>
+              </a:rPr>
+              <a:t>object</a:t>
+            </a:r>
+            <a:r>
+              <a:rPr lang="en-US" dirty="0">
+                <a:solidFill>
+                  <a:srgbClr val="000000"/>
+                </a:solidFill>
+                <a:latin typeface="Consolas" panose="020B0609020204030204" pitchFamily="49" charset="0"/>
+              </a:rPr>
+              <a:t>&gt; </a:t>
+            </a:r>
+            <a:r>
+              <a:rPr lang="en-US" dirty="0" err="1">
+                <a:solidFill>
+                  <a:srgbClr val="000000"/>
+                </a:solidFill>
+                <a:latin typeface="Consolas" panose="020B0609020204030204" pitchFamily="49" charset="0"/>
+              </a:rPr>
+              <a:t>PrepareAsync</a:t>
+            </a:r>
+            <a:r>
+              <a:rPr lang="en-US" dirty="0">
+                <a:solidFill>
+                  <a:srgbClr val="000000"/>
+                </a:solidFill>
+                <a:latin typeface="Consolas" panose="020B0609020204030204" pitchFamily="49" charset="0"/>
+              </a:rPr>
+              <a:t>(</a:t>
+            </a:r>
+            <a:r>
+              <a:rPr lang="en-US" dirty="0">
+                <a:solidFill>
+                  <a:srgbClr val="2B91AF"/>
+                </a:solidFill>
+                <a:latin typeface="Consolas" panose="020B0609020204030204" pitchFamily="49" charset="0"/>
+              </a:rPr>
+              <a:t>Item</a:t>
+            </a:r>
+            <a:r>
+              <a:rPr lang="en-US" dirty="0">
+                <a:solidFill>
+                  <a:srgbClr val="000000"/>
+                </a:solidFill>
+                <a:latin typeface="Consolas" panose="020B0609020204030204" pitchFamily="49" charset="0"/>
+              </a:rPr>
+              <a:t> </a:t>
+            </a:r>
+            <a:r>
+              <a:rPr lang="en-US" dirty="0" err="1">
+                <a:solidFill>
+                  <a:srgbClr val="000000"/>
+                </a:solidFill>
+                <a:latin typeface="Consolas" panose="020B0609020204030204" pitchFamily="49" charset="0"/>
+              </a:rPr>
+              <a:t>item</a:t>
+            </a:r>
+            <a:r>
+              <a:rPr lang="en-US" dirty="0">
+                <a:solidFill>
+                  <a:srgbClr val="000000"/>
+                </a:solidFill>
+                <a:latin typeface="Consolas" panose="020B0609020204030204" pitchFamily="49" charset="0"/>
+              </a:rPr>
+              <a:t>, </a:t>
+            </a:r>
+            <a:r>
+              <a:rPr lang="en-US" dirty="0" err="1">
+                <a:solidFill>
+                  <a:srgbClr val="2B91AF"/>
+                </a:solidFill>
+                <a:latin typeface="Consolas" panose="020B0609020204030204" pitchFamily="49" charset="0"/>
+              </a:rPr>
+              <a:t>CancellationToken</a:t>
+            </a:r>
+            <a:r>
+              <a:rPr lang="en-US" dirty="0">
+                <a:solidFill>
+                  <a:srgbClr val="000000"/>
+                </a:solidFill>
+                <a:latin typeface="Consolas" panose="020B0609020204030204" pitchFamily="49" charset="0"/>
+              </a:rPr>
+              <a:t> token);</a:t>
+            </a:r>
+            <a:br>
+              <a:rPr lang="en-US" dirty="0">
+                <a:solidFill>
+                  <a:srgbClr val="000000"/>
+                </a:solidFill>
+                <a:latin typeface="Consolas" panose="020B0609020204030204" pitchFamily="49" charset="0"/>
+              </a:rPr>
+            </a:br>
+            <a:br>
+              <a:rPr lang="en-US" dirty="0">
+                <a:solidFill>
+                  <a:srgbClr val="000000"/>
+                </a:solidFill>
+                <a:latin typeface="Consolas" panose="020B0609020204030204" pitchFamily="49" charset="0"/>
+              </a:rPr>
+            </a:br>
+            <a:r>
+              <a:rPr lang="en-US" dirty="0">
+                <a:solidFill>
+                  <a:srgbClr val="000000"/>
+                </a:solidFill>
+                <a:latin typeface="Consolas" panose="020B0609020204030204" pitchFamily="49" charset="0"/>
+              </a:rPr>
+              <a:t>        </a:t>
+            </a:r>
+            <a:r>
+              <a:rPr lang="en-US" dirty="0">
+                <a:solidFill>
+                  <a:srgbClr val="808080"/>
+                </a:solidFill>
+                <a:latin typeface="Consolas" panose="020B0609020204030204" pitchFamily="49" charset="0"/>
+              </a:rPr>
+              <a:t>///</a:t>
+            </a:r>
+            <a:r>
+              <a:rPr lang="en-US" dirty="0">
+                <a:solidFill>
+                  <a:srgbClr val="008000"/>
+                </a:solidFill>
+                <a:latin typeface="Consolas" panose="020B0609020204030204" pitchFamily="49" charset="0"/>
+              </a:rPr>
+              <a:t> </a:t>
+            </a:r>
+            <a:r>
+              <a:rPr lang="en-US" dirty="0">
+                <a:solidFill>
+                  <a:srgbClr val="808080"/>
+                </a:solidFill>
+                <a:latin typeface="Consolas" panose="020B0609020204030204" pitchFamily="49" charset="0"/>
+              </a:rPr>
+              <a:t>&lt;summary&gt;</a:t>
+            </a:r>
+            <a:br>
+              <a:rPr lang="en-US" dirty="0">
+                <a:solidFill>
+                  <a:srgbClr val="808080"/>
+                </a:solidFill>
+                <a:latin typeface="Consolas" panose="020B0609020204030204" pitchFamily="49" charset="0"/>
+              </a:rPr>
+            </a:br>
+            <a:r>
+              <a:rPr lang="en-US" dirty="0">
+                <a:solidFill>
+                  <a:srgbClr val="000000"/>
+                </a:solidFill>
+                <a:latin typeface="Consolas" panose="020B0609020204030204" pitchFamily="49" charset="0"/>
+              </a:rPr>
+              <a:t>        </a:t>
+            </a:r>
+            <a:r>
+              <a:rPr lang="en-US" dirty="0">
+                <a:solidFill>
+                  <a:srgbClr val="808080"/>
+                </a:solidFill>
+                <a:latin typeface="Consolas" panose="020B0609020204030204" pitchFamily="49" charset="0"/>
+              </a:rPr>
+              <a:t>///</a:t>
+            </a:r>
+            <a:r>
+              <a:rPr lang="en-US" dirty="0">
+                <a:solidFill>
+                  <a:srgbClr val="008000"/>
+                </a:solidFill>
+                <a:latin typeface="Consolas" panose="020B0609020204030204" pitchFamily="49" charset="0"/>
+              </a:rPr>
+              <a:t> Returns whether this scorable wants to participate in scoring this item.</a:t>
+            </a:r>
+            <a:br>
+              <a:rPr lang="en-US" dirty="0">
+                <a:solidFill>
+                  <a:srgbClr val="008000"/>
+                </a:solidFill>
+                <a:latin typeface="Consolas" panose="020B0609020204030204" pitchFamily="49" charset="0"/>
+              </a:rPr>
+            </a:br>
+            <a:r>
+              <a:rPr lang="en-US" dirty="0">
+                <a:solidFill>
+                  <a:srgbClr val="000000"/>
+                </a:solidFill>
+                <a:latin typeface="Consolas" panose="020B0609020204030204" pitchFamily="49" charset="0"/>
+              </a:rPr>
+              <a:t>        </a:t>
+            </a:r>
+            <a:r>
+              <a:rPr lang="en-US" dirty="0">
+                <a:solidFill>
+                  <a:srgbClr val="808080"/>
+                </a:solidFill>
+                <a:latin typeface="Consolas" panose="020B0609020204030204" pitchFamily="49" charset="0"/>
+              </a:rPr>
+              <a:t>///</a:t>
+            </a:r>
+            <a:r>
+              <a:rPr lang="en-US" dirty="0">
+                <a:solidFill>
+                  <a:srgbClr val="008000"/>
+                </a:solidFill>
+                <a:latin typeface="Consolas" panose="020B0609020204030204" pitchFamily="49" charset="0"/>
+              </a:rPr>
+              <a:t> </a:t>
+            </a:r>
+            <a:r>
+              <a:rPr lang="en-US" dirty="0">
+                <a:solidFill>
+                  <a:srgbClr val="808080"/>
+                </a:solidFill>
+                <a:latin typeface="Consolas" panose="020B0609020204030204" pitchFamily="49" charset="0"/>
+              </a:rPr>
+              <a:t>&lt;/summary&gt;</a:t>
+            </a:r>
+            <a:br>
+              <a:rPr lang="en-US" dirty="0">
+                <a:solidFill>
+                  <a:srgbClr val="808080"/>
+                </a:solidFill>
+                <a:latin typeface="Consolas" panose="020B0609020204030204" pitchFamily="49" charset="0"/>
+              </a:rPr>
+            </a:br>
+            <a:r>
+              <a:rPr lang="en-US" dirty="0">
+                <a:solidFill>
+                  <a:srgbClr val="000000"/>
+                </a:solidFill>
+                <a:latin typeface="Consolas" panose="020B0609020204030204" pitchFamily="49" charset="0"/>
+              </a:rPr>
+              <a:t>        </a:t>
+            </a:r>
+            <a:r>
+              <a:rPr lang="en-US" dirty="0">
+                <a:solidFill>
+                  <a:srgbClr val="0000FF"/>
+                </a:solidFill>
+                <a:latin typeface="Consolas" panose="020B0609020204030204" pitchFamily="49" charset="0"/>
+              </a:rPr>
+              <a:t>bool</a:t>
+            </a:r>
+            <a:r>
+              <a:rPr lang="en-US" dirty="0">
+                <a:solidFill>
+                  <a:srgbClr val="000000"/>
+                </a:solidFill>
+                <a:latin typeface="Consolas" panose="020B0609020204030204" pitchFamily="49" charset="0"/>
+              </a:rPr>
+              <a:t> </a:t>
+            </a:r>
+            <a:r>
+              <a:rPr lang="en-US" dirty="0" err="1">
+                <a:solidFill>
+                  <a:srgbClr val="000000"/>
+                </a:solidFill>
+                <a:latin typeface="Consolas" panose="020B0609020204030204" pitchFamily="49" charset="0"/>
+              </a:rPr>
+              <a:t>HasScore</a:t>
+            </a:r>
+            <a:r>
+              <a:rPr lang="en-US" dirty="0">
+                <a:solidFill>
+                  <a:srgbClr val="000000"/>
+                </a:solidFill>
+                <a:latin typeface="Consolas" panose="020B0609020204030204" pitchFamily="49" charset="0"/>
+              </a:rPr>
+              <a:t>(</a:t>
+            </a:r>
+            <a:r>
+              <a:rPr lang="en-US" dirty="0">
+                <a:solidFill>
+                  <a:srgbClr val="2B91AF"/>
+                </a:solidFill>
+                <a:latin typeface="Consolas" panose="020B0609020204030204" pitchFamily="49" charset="0"/>
+              </a:rPr>
+              <a:t>Item</a:t>
+            </a:r>
+            <a:r>
+              <a:rPr lang="en-US" dirty="0">
+                <a:solidFill>
+                  <a:srgbClr val="000000"/>
+                </a:solidFill>
+                <a:latin typeface="Consolas" panose="020B0609020204030204" pitchFamily="49" charset="0"/>
+              </a:rPr>
+              <a:t> </a:t>
+            </a:r>
+            <a:r>
+              <a:rPr lang="en-US" dirty="0" err="1">
+                <a:solidFill>
+                  <a:srgbClr val="000000"/>
+                </a:solidFill>
+                <a:latin typeface="Consolas" panose="020B0609020204030204" pitchFamily="49" charset="0"/>
+              </a:rPr>
+              <a:t>item</a:t>
+            </a:r>
+            <a:r>
+              <a:rPr lang="en-US" dirty="0">
+                <a:solidFill>
+                  <a:srgbClr val="000000"/>
+                </a:solidFill>
+                <a:latin typeface="Consolas" panose="020B0609020204030204" pitchFamily="49" charset="0"/>
+              </a:rPr>
+              <a:t>, </a:t>
+            </a:r>
+            <a:r>
+              <a:rPr lang="en-US" dirty="0">
+                <a:solidFill>
+                  <a:srgbClr val="0000FF"/>
+                </a:solidFill>
+                <a:latin typeface="Consolas" panose="020B0609020204030204" pitchFamily="49" charset="0"/>
+              </a:rPr>
+              <a:t>object</a:t>
+            </a:r>
+            <a:r>
+              <a:rPr lang="en-US" dirty="0">
+                <a:solidFill>
+                  <a:srgbClr val="000000"/>
+                </a:solidFill>
+                <a:latin typeface="Consolas" panose="020B0609020204030204" pitchFamily="49" charset="0"/>
+              </a:rPr>
+              <a:t> state);</a:t>
+            </a:r>
+            <a:br>
+              <a:rPr lang="en-US" dirty="0">
+                <a:solidFill>
+                  <a:srgbClr val="000000"/>
+                </a:solidFill>
+                <a:latin typeface="Consolas" panose="020B0609020204030204" pitchFamily="49" charset="0"/>
+              </a:rPr>
+            </a:br>
+            <a:br>
+              <a:rPr lang="en-US" dirty="0">
+                <a:solidFill>
+                  <a:srgbClr val="000000"/>
+                </a:solidFill>
+                <a:latin typeface="Consolas" panose="020B0609020204030204" pitchFamily="49" charset="0"/>
+              </a:rPr>
+            </a:br>
+            <a:r>
+              <a:rPr lang="en-US" dirty="0">
+                <a:solidFill>
+                  <a:srgbClr val="000000"/>
+                </a:solidFill>
+                <a:latin typeface="Consolas" panose="020B0609020204030204" pitchFamily="49" charset="0"/>
+              </a:rPr>
+              <a:t>        </a:t>
+            </a:r>
+            <a:r>
+              <a:rPr lang="en-US" dirty="0">
+                <a:solidFill>
+                  <a:srgbClr val="808080"/>
+                </a:solidFill>
+                <a:latin typeface="Consolas" panose="020B0609020204030204" pitchFamily="49" charset="0"/>
+              </a:rPr>
+              <a:t>///</a:t>
+            </a:r>
+            <a:r>
+              <a:rPr lang="en-US" dirty="0">
+                <a:solidFill>
+                  <a:srgbClr val="008000"/>
+                </a:solidFill>
+                <a:latin typeface="Consolas" panose="020B0609020204030204" pitchFamily="49" charset="0"/>
+              </a:rPr>
+              <a:t> </a:t>
+            </a:r>
+            <a:r>
+              <a:rPr lang="en-US" dirty="0">
+                <a:solidFill>
+                  <a:srgbClr val="808080"/>
+                </a:solidFill>
+                <a:latin typeface="Consolas" panose="020B0609020204030204" pitchFamily="49" charset="0"/>
+              </a:rPr>
+              <a:t>&lt;summary&gt;</a:t>
+            </a:r>
+            <a:br>
+              <a:rPr lang="en-US" dirty="0">
+                <a:solidFill>
+                  <a:srgbClr val="808080"/>
+                </a:solidFill>
+                <a:latin typeface="Consolas" panose="020B0609020204030204" pitchFamily="49" charset="0"/>
+              </a:rPr>
+            </a:br>
+            <a:r>
+              <a:rPr lang="en-US" dirty="0">
+                <a:solidFill>
+                  <a:srgbClr val="000000"/>
+                </a:solidFill>
+                <a:latin typeface="Consolas" panose="020B0609020204030204" pitchFamily="49" charset="0"/>
+              </a:rPr>
+              <a:t>        </a:t>
+            </a:r>
+            <a:r>
+              <a:rPr lang="en-US" dirty="0">
+                <a:solidFill>
+                  <a:srgbClr val="808080"/>
+                </a:solidFill>
+                <a:latin typeface="Consolas" panose="020B0609020204030204" pitchFamily="49" charset="0"/>
+              </a:rPr>
+              <a:t>///</a:t>
+            </a:r>
+            <a:r>
+              <a:rPr lang="en-US" dirty="0">
+                <a:solidFill>
+                  <a:srgbClr val="008000"/>
+                </a:solidFill>
+                <a:latin typeface="Consolas" panose="020B0609020204030204" pitchFamily="49" charset="0"/>
+              </a:rPr>
+              <a:t> Gets the score for this item.</a:t>
+            </a:r>
+            <a:br>
+              <a:rPr lang="en-US" dirty="0">
+                <a:solidFill>
+                  <a:srgbClr val="008000"/>
+                </a:solidFill>
+                <a:latin typeface="Consolas" panose="020B0609020204030204" pitchFamily="49" charset="0"/>
+              </a:rPr>
+            </a:br>
+            <a:r>
+              <a:rPr lang="en-US" dirty="0">
+                <a:solidFill>
+                  <a:srgbClr val="000000"/>
+                </a:solidFill>
+                <a:latin typeface="Consolas" panose="020B0609020204030204" pitchFamily="49" charset="0"/>
+              </a:rPr>
+              <a:t>        </a:t>
+            </a:r>
+            <a:r>
+              <a:rPr lang="en-US" dirty="0">
+                <a:solidFill>
+                  <a:srgbClr val="808080"/>
+                </a:solidFill>
+                <a:latin typeface="Consolas" panose="020B0609020204030204" pitchFamily="49" charset="0"/>
+              </a:rPr>
+              <a:t>///</a:t>
+            </a:r>
+            <a:r>
+              <a:rPr lang="en-US" dirty="0">
+                <a:solidFill>
+                  <a:srgbClr val="008000"/>
+                </a:solidFill>
+                <a:latin typeface="Consolas" panose="020B0609020204030204" pitchFamily="49" charset="0"/>
+              </a:rPr>
+              <a:t> </a:t>
+            </a:r>
+            <a:r>
+              <a:rPr lang="en-US" dirty="0">
+                <a:solidFill>
+                  <a:srgbClr val="808080"/>
+                </a:solidFill>
+                <a:latin typeface="Consolas" panose="020B0609020204030204" pitchFamily="49" charset="0"/>
+              </a:rPr>
+              <a:t>&lt;/summary&gt;</a:t>
+            </a:r>
+            <a:br>
+              <a:rPr lang="en-US" dirty="0">
+                <a:solidFill>
+                  <a:srgbClr val="808080"/>
+                </a:solidFill>
+                <a:latin typeface="Consolas" panose="020B0609020204030204" pitchFamily="49" charset="0"/>
+              </a:rPr>
+            </a:br>
+            <a:r>
+              <a:rPr lang="en-US" dirty="0">
+                <a:solidFill>
+                  <a:srgbClr val="000000"/>
+                </a:solidFill>
+                <a:latin typeface="Consolas" panose="020B0609020204030204" pitchFamily="49" charset="0"/>
+              </a:rPr>
+              <a:t>        </a:t>
+            </a:r>
+            <a:r>
+              <a:rPr lang="en-US" dirty="0">
+                <a:solidFill>
+                  <a:srgbClr val="2B91AF"/>
+                </a:solidFill>
+                <a:latin typeface="Consolas" panose="020B0609020204030204" pitchFamily="49" charset="0"/>
+              </a:rPr>
+              <a:t>Score</a:t>
+            </a:r>
+            <a:r>
+              <a:rPr lang="en-US" dirty="0">
+                <a:solidFill>
+                  <a:srgbClr val="000000"/>
+                </a:solidFill>
+                <a:latin typeface="Consolas" panose="020B0609020204030204" pitchFamily="49" charset="0"/>
+              </a:rPr>
+              <a:t> </a:t>
+            </a:r>
+            <a:r>
+              <a:rPr lang="en-US" dirty="0" err="1">
+                <a:solidFill>
+                  <a:srgbClr val="000000"/>
+                </a:solidFill>
+                <a:latin typeface="Consolas" panose="020B0609020204030204" pitchFamily="49" charset="0"/>
+              </a:rPr>
+              <a:t>GetScore</a:t>
+            </a:r>
+            <a:r>
+              <a:rPr lang="en-US" dirty="0">
+                <a:solidFill>
+                  <a:srgbClr val="000000"/>
+                </a:solidFill>
+                <a:latin typeface="Consolas" panose="020B0609020204030204" pitchFamily="49" charset="0"/>
+              </a:rPr>
+              <a:t>(</a:t>
+            </a:r>
+            <a:r>
+              <a:rPr lang="en-US" dirty="0">
+                <a:solidFill>
+                  <a:srgbClr val="2B91AF"/>
+                </a:solidFill>
+                <a:latin typeface="Consolas" panose="020B0609020204030204" pitchFamily="49" charset="0"/>
+              </a:rPr>
+              <a:t>Item</a:t>
+            </a:r>
+            <a:r>
+              <a:rPr lang="en-US" dirty="0">
+                <a:solidFill>
+                  <a:srgbClr val="000000"/>
+                </a:solidFill>
+                <a:latin typeface="Consolas" panose="020B0609020204030204" pitchFamily="49" charset="0"/>
+              </a:rPr>
+              <a:t> </a:t>
+            </a:r>
+            <a:r>
+              <a:rPr lang="en-US" dirty="0" err="1">
+                <a:solidFill>
+                  <a:srgbClr val="000000"/>
+                </a:solidFill>
+                <a:latin typeface="Consolas" panose="020B0609020204030204" pitchFamily="49" charset="0"/>
+              </a:rPr>
+              <a:t>item</a:t>
+            </a:r>
+            <a:r>
+              <a:rPr lang="en-US" dirty="0">
+                <a:solidFill>
+                  <a:srgbClr val="000000"/>
+                </a:solidFill>
+                <a:latin typeface="Consolas" panose="020B0609020204030204" pitchFamily="49" charset="0"/>
+              </a:rPr>
+              <a:t>, </a:t>
+            </a:r>
+            <a:r>
+              <a:rPr lang="en-US" dirty="0">
+                <a:solidFill>
+                  <a:srgbClr val="0000FF"/>
+                </a:solidFill>
+                <a:latin typeface="Consolas" panose="020B0609020204030204" pitchFamily="49" charset="0"/>
+              </a:rPr>
+              <a:t>object</a:t>
+            </a:r>
+            <a:r>
+              <a:rPr lang="en-US" dirty="0">
+                <a:solidFill>
+                  <a:srgbClr val="000000"/>
+                </a:solidFill>
+                <a:latin typeface="Consolas" panose="020B0609020204030204" pitchFamily="49" charset="0"/>
+              </a:rPr>
+              <a:t> state);</a:t>
+            </a:r>
+            <a:br>
+              <a:rPr lang="en-US" dirty="0">
+                <a:solidFill>
+                  <a:srgbClr val="000000"/>
+                </a:solidFill>
+                <a:latin typeface="Consolas" panose="020B0609020204030204" pitchFamily="49" charset="0"/>
+              </a:rPr>
+            </a:br>
+            <a:br>
+              <a:rPr lang="en-US" dirty="0">
+                <a:solidFill>
+                  <a:srgbClr val="000000"/>
+                </a:solidFill>
+                <a:latin typeface="Consolas" panose="020B0609020204030204" pitchFamily="49" charset="0"/>
+              </a:rPr>
+            </a:br>
+            <a:r>
+              <a:rPr lang="en-US" dirty="0">
+                <a:solidFill>
+                  <a:srgbClr val="000000"/>
+                </a:solidFill>
+                <a:latin typeface="Consolas" panose="020B0609020204030204" pitchFamily="49" charset="0"/>
+              </a:rPr>
+              <a:t>        </a:t>
+            </a:r>
+            <a:r>
+              <a:rPr lang="en-US" dirty="0">
+                <a:solidFill>
+                  <a:srgbClr val="808080"/>
+                </a:solidFill>
+                <a:latin typeface="Consolas" panose="020B0609020204030204" pitchFamily="49" charset="0"/>
+              </a:rPr>
+              <a:t>///</a:t>
+            </a:r>
+            <a:r>
+              <a:rPr lang="en-US" dirty="0">
+                <a:solidFill>
+                  <a:srgbClr val="008000"/>
+                </a:solidFill>
+                <a:latin typeface="Consolas" panose="020B0609020204030204" pitchFamily="49" charset="0"/>
+              </a:rPr>
+              <a:t> </a:t>
+            </a:r>
+            <a:r>
+              <a:rPr lang="en-US" dirty="0">
+                <a:solidFill>
+                  <a:srgbClr val="808080"/>
+                </a:solidFill>
+                <a:latin typeface="Consolas" panose="020B0609020204030204" pitchFamily="49" charset="0"/>
+              </a:rPr>
+              <a:t>&lt;summary&gt;</a:t>
+            </a:r>
+            <a:br>
+              <a:rPr lang="en-US" dirty="0">
+                <a:solidFill>
+                  <a:srgbClr val="808080"/>
+                </a:solidFill>
+                <a:latin typeface="Consolas" panose="020B0609020204030204" pitchFamily="49" charset="0"/>
+              </a:rPr>
+            </a:br>
+            <a:r>
+              <a:rPr lang="en-US" dirty="0">
+                <a:solidFill>
+                  <a:srgbClr val="000000"/>
+                </a:solidFill>
+                <a:latin typeface="Consolas" panose="020B0609020204030204" pitchFamily="49" charset="0"/>
+              </a:rPr>
+              <a:t>        </a:t>
+            </a:r>
+            <a:r>
+              <a:rPr lang="en-US" dirty="0">
+                <a:solidFill>
+                  <a:srgbClr val="808080"/>
+                </a:solidFill>
+                <a:latin typeface="Consolas" panose="020B0609020204030204" pitchFamily="49" charset="0"/>
+              </a:rPr>
+              <a:t>///</a:t>
+            </a:r>
+            <a:r>
+              <a:rPr lang="en-US" dirty="0">
+                <a:solidFill>
+                  <a:srgbClr val="008000"/>
+                </a:solidFill>
+                <a:latin typeface="Consolas" panose="020B0609020204030204" pitchFamily="49" charset="0"/>
+              </a:rPr>
+              <a:t> If this scorable wins, this method is called.</a:t>
+            </a:r>
+            <a:br>
+              <a:rPr lang="en-US" dirty="0">
+                <a:solidFill>
+                  <a:srgbClr val="008000"/>
+                </a:solidFill>
+                <a:latin typeface="Consolas" panose="020B0609020204030204" pitchFamily="49" charset="0"/>
+              </a:rPr>
+            </a:br>
+            <a:r>
+              <a:rPr lang="en-US" dirty="0">
+                <a:solidFill>
+                  <a:srgbClr val="000000"/>
+                </a:solidFill>
+                <a:latin typeface="Consolas" panose="020B0609020204030204" pitchFamily="49" charset="0"/>
+              </a:rPr>
+              <a:t>        </a:t>
+            </a:r>
+            <a:r>
+              <a:rPr lang="en-US" dirty="0">
+                <a:solidFill>
+                  <a:srgbClr val="808080"/>
+                </a:solidFill>
+                <a:latin typeface="Consolas" panose="020B0609020204030204" pitchFamily="49" charset="0"/>
+              </a:rPr>
+              <a:t>///</a:t>
+            </a:r>
+            <a:r>
+              <a:rPr lang="en-US" dirty="0">
+                <a:solidFill>
+                  <a:srgbClr val="008000"/>
+                </a:solidFill>
+                <a:latin typeface="Consolas" panose="020B0609020204030204" pitchFamily="49" charset="0"/>
+              </a:rPr>
+              <a:t> </a:t>
+            </a:r>
+            <a:r>
+              <a:rPr lang="en-US" dirty="0">
+                <a:solidFill>
+                  <a:srgbClr val="808080"/>
+                </a:solidFill>
+                <a:latin typeface="Consolas" panose="020B0609020204030204" pitchFamily="49" charset="0"/>
+              </a:rPr>
+              <a:t>&lt;/summary&gt;</a:t>
+            </a:r>
+            <a:br>
+              <a:rPr lang="en-US" dirty="0">
+                <a:solidFill>
+                  <a:srgbClr val="808080"/>
+                </a:solidFill>
+                <a:latin typeface="Consolas" panose="020B0609020204030204" pitchFamily="49" charset="0"/>
+              </a:rPr>
+            </a:br>
+            <a:r>
+              <a:rPr lang="en-US" dirty="0">
+                <a:solidFill>
+                  <a:srgbClr val="000000"/>
+                </a:solidFill>
+                <a:latin typeface="Consolas" panose="020B0609020204030204" pitchFamily="49" charset="0"/>
+              </a:rPr>
+              <a:t>        </a:t>
+            </a:r>
+            <a:r>
+              <a:rPr lang="en-US" dirty="0">
+                <a:solidFill>
+                  <a:srgbClr val="2B91AF"/>
+                </a:solidFill>
+                <a:latin typeface="Consolas" panose="020B0609020204030204" pitchFamily="49" charset="0"/>
+              </a:rPr>
+              <a:t>Task</a:t>
+            </a:r>
+            <a:r>
+              <a:rPr lang="en-US" dirty="0">
+                <a:solidFill>
+                  <a:srgbClr val="000000"/>
+                </a:solidFill>
+                <a:latin typeface="Consolas" panose="020B0609020204030204" pitchFamily="49" charset="0"/>
+              </a:rPr>
+              <a:t> </a:t>
+            </a:r>
+            <a:r>
+              <a:rPr lang="en-US" dirty="0" err="1">
+                <a:solidFill>
+                  <a:srgbClr val="000000"/>
+                </a:solidFill>
+                <a:latin typeface="Consolas" panose="020B0609020204030204" pitchFamily="49" charset="0"/>
+              </a:rPr>
+              <a:t>PostAsync</a:t>
+            </a:r>
+            <a:r>
+              <a:rPr lang="en-US" dirty="0">
+                <a:solidFill>
+                  <a:srgbClr val="000000"/>
+                </a:solidFill>
+                <a:latin typeface="Consolas" panose="020B0609020204030204" pitchFamily="49" charset="0"/>
+              </a:rPr>
+              <a:t>(</a:t>
+            </a:r>
+            <a:r>
+              <a:rPr lang="en-US" dirty="0">
+                <a:solidFill>
+                  <a:srgbClr val="2B91AF"/>
+                </a:solidFill>
+                <a:latin typeface="Consolas" panose="020B0609020204030204" pitchFamily="49" charset="0"/>
+              </a:rPr>
+              <a:t>Item</a:t>
+            </a:r>
+            <a:r>
+              <a:rPr lang="en-US" dirty="0">
+                <a:solidFill>
+                  <a:srgbClr val="000000"/>
+                </a:solidFill>
+                <a:latin typeface="Consolas" panose="020B0609020204030204" pitchFamily="49" charset="0"/>
+              </a:rPr>
+              <a:t> </a:t>
+            </a:r>
+            <a:r>
+              <a:rPr lang="en-US" dirty="0" err="1">
+                <a:solidFill>
+                  <a:srgbClr val="000000"/>
+                </a:solidFill>
+                <a:latin typeface="Consolas" panose="020B0609020204030204" pitchFamily="49" charset="0"/>
+              </a:rPr>
+              <a:t>item</a:t>
+            </a:r>
+            <a:r>
+              <a:rPr lang="en-US" dirty="0">
+                <a:solidFill>
+                  <a:srgbClr val="000000"/>
+                </a:solidFill>
+                <a:latin typeface="Consolas" panose="020B0609020204030204" pitchFamily="49" charset="0"/>
+              </a:rPr>
+              <a:t>, </a:t>
+            </a:r>
+            <a:r>
+              <a:rPr lang="en-US" dirty="0">
+                <a:solidFill>
+                  <a:srgbClr val="0000FF"/>
+                </a:solidFill>
+                <a:latin typeface="Consolas" panose="020B0609020204030204" pitchFamily="49" charset="0"/>
+              </a:rPr>
+              <a:t>object</a:t>
+            </a:r>
+            <a:r>
+              <a:rPr lang="en-US" dirty="0">
+                <a:solidFill>
+                  <a:srgbClr val="000000"/>
+                </a:solidFill>
+                <a:latin typeface="Consolas" panose="020B0609020204030204" pitchFamily="49" charset="0"/>
+              </a:rPr>
+              <a:t> state, </a:t>
+            </a:r>
+            <a:r>
+              <a:rPr lang="en-US" dirty="0" err="1">
+                <a:solidFill>
+                  <a:srgbClr val="2B91AF"/>
+                </a:solidFill>
+                <a:latin typeface="Consolas" panose="020B0609020204030204" pitchFamily="49" charset="0"/>
+              </a:rPr>
+              <a:t>CancellationToken</a:t>
+            </a:r>
+            <a:r>
+              <a:rPr lang="en-US" dirty="0">
+                <a:solidFill>
+                  <a:srgbClr val="000000"/>
+                </a:solidFill>
+                <a:latin typeface="Consolas" panose="020B0609020204030204" pitchFamily="49" charset="0"/>
+              </a:rPr>
+              <a:t> token);</a:t>
+            </a:r>
+            <a:br>
+              <a:rPr lang="en-US" dirty="0">
+                <a:solidFill>
+                  <a:srgbClr val="000000"/>
+                </a:solidFill>
+                <a:latin typeface="Consolas" panose="020B0609020204030204" pitchFamily="49" charset="0"/>
+              </a:rPr>
+            </a:br>
+            <a:br>
+              <a:rPr lang="en-US" dirty="0">
+                <a:solidFill>
+                  <a:srgbClr val="000000"/>
+                </a:solidFill>
+                <a:latin typeface="Consolas" panose="020B0609020204030204" pitchFamily="49" charset="0"/>
+              </a:rPr>
+            </a:br>
+            <a:r>
+              <a:rPr lang="en-US" dirty="0">
+                <a:solidFill>
+                  <a:srgbClr val="000000"/>
+                </a:solidFill>
+                <a:latin typeface="Consolas" panose="020B0609020204030204" pitchFamily="49" charset="0"/>
+              </a:rPr>
+              <a:t>        </a:t>
+            </a:r>
+            <a:r>
+              <a:rPr lang="en-US" dirty="0">
+                <a:solidFill>
+                  <a:srgbClr val="808080"/>
+                </a:solidFill>
+                <a:latin typeface="Consolas" panose="020B0609020204030204" pitchFamily="49" charset="0"/>
+              </a:rPr>
+              <a:t>///</a:t>
+            </a:r>
+            <a:r>
+              <a:rPr lang="en-US" dirty="0">
+                <a:solidFill>
+                  <a:srgbClr val="008000"/>
+                </a:solidFill>
+                <a:latin typeface="Consolas" panose="020B0609020204030204" pitchFamily="49" charset="0"/>
+              </a:rPr>
+              <a:t> </a:t>
+            </a:r>
+            <a:r>
+              <a:rPr lang="en-US" dirty="0">
+                <a:solidFill>
+                  <a:srgbClr val="808080"/>
+                </a:solidFill>
+                <a:latin typeface="Consolas" panose="020B0609020204030204" pitchFamily="49" charset="0"/>
+              </a:rPr>
+              <a:t>&lt;summary&gt;</a:t>
+            </a:r>
+            <a:br>
+              <a:rPr lang="en-US" dirty="0">
+                <a:solidFill>
+                  <a:srgbClr val="808080"/>
+                </a:solidFill>
+                <a:latin typeface="Consolas" panose="020B0609020204030204" pitchFamily="49" charset="0"/>
+              </a:rPr>
+            </a:br>
+            <a:r>
+              <a:rPr lang="en-US" dirty="0">
+                <a:solidFill>
+                  <a:srgbClr val="000000"/>
+                </a:solidFill>
+                <a:latin typeface="Consolas" panose="020B0609020204030204" pitchFamily="49" charset="0"/>
+              </a:rPr>
+              <a:t>        </a:t>
+            </a:r>
+            <a:r>
+              <a:rPr lang="en-US" dirty="0">
+                <a:solidFill>
+                  <a:srgbClr val="808080"/>
+                </a:solidFill>
+                <a:latin typeface="Consolas" panose="020B0609020204030204" pitchFamily="49" charset="0"/>
+              </a:rPr>
+              <a:t>///</a:t>
+            </a:r>
+            <a:r>
+              <a:rPr lang="en-US" dirty="0">
+                <a:solidFill>
+                  <a:srgbClr val="008000"/>
+                </a:solidFill>
+                <a:latin typeface="Consolas" panose="020B0609020204030204" pitchFamily="49" charset="0"/>
+              </a:rPr>
+              <a:t> The scoring process has completed - dispose of any scoped resources.</a:t>
+            </a:r>
+            <a:br>
+              <a:rPr lang="en-US" dirty="0">
+                <a:solidFill>
+                  <a:srgbClr val="008000"/>
+                </a:solidFill>
+                <a:latin typeface="Consolas" panose="020B0609020204030204" pitchFamily="49" charset="0"/>
+              </a:rPr>
+            </a:br>
+            <a:r>
+              <a:rPr lang="en-US" dirty="0">
+                <a:solidFill>
+                  <a:srgbClr val="000000"/>
+                </a:solidFill>
+                <a:latin typeface="Consolas" panose="020B0609020204030204" pitchFamily="49" charset="0"/>
+              </a:rPr>
+              <a:t>        </a:t>
+            </a:r>
+            <a:r>
+              <a:rPr lang="en-US" dirty="0">
+                <a:solidFill>
+                  <a:srgbClr val="808080"/>
+                </a:solidFill>
+                <a:latin typeface="Consolas" panose="020B0609020204030204" pitchFamily="49" charset="0"/>
+              </a:rPr>
+              <a:t>///</a:t>
+            </a:r>
+            <a:r>
+              <a:rPr lang="en-US" dirty="0">
+                <a:solidFill>
+                  <a:srgbClr val="008000"/>
+                </a:solidFill>
+                <a:latin typeface="Consolas" panose="020B0609020204030204" pitchFamily="49" charset="0"/>
+              </a:rPr>
+              <a:t> </a:t>
+            </a:r>
+            <a:r>
+              <a:rPr lang="en-US" dirty="0">
+                <a:solidFill>
+                  <a:srgbClr val="808080"/>
+                </a:solidFill>
+                <a:latin typeface="Consolas" panose="020B0609020204030204" pitchFamily="49" charset="0"/>
+              </a:rPr>
+              <a:t>&lt;/summary&gt;</a:t>
+            </a:r>
+            <a:br>
+              <a:rPr lang="en-US" dirty="0">
+                <a:solidFill>
+                  <a:srgbClr val="808080"/>
+                </a:solidFill>
+                <a:latin typeface="Consolas" panose="020B0609020204030204" pitchFamily="49" charset="0"/>
+              </a:rPr>
+            </a:br>
+            <a:r>
+              <a:rPr lang="en-US" dirty="0">
+                <a:solidFill>
+                  <a:srgbClr val="000000"/>
+                </a:solidFill>
+                <a:latin typeface="Consolas" panose="020B0609020204030204" pitchFamily="49" charset="0"/>
+              </a:rPr>
+              <a:t>        </a:t>
+            </a:r>
+            <a:r>
+              <a:rPr lang="en-US" dirty="0">
+                <a:solidFill>
+                  <a:srgbClr val="2B91AF"/>
+                </a:solidFill>
+                <a:latin typeface="Consolas" panose="020B0609020204030204" pitchFamily="49" charset="0"/>
+              </a:rPr>
+              <a:t>Task</a:t>
+            </a:r>
+            <a:r>
+              <a:rPr lang="en-US" dirty="0">
+                <a:solidFill>
+                  <a:srgbClr val="000000"/>
+                </a:solidFill>
+                <a:latin typeface="Consolas" panose="020B0609020204030204" pitchFamily="49" charset="0"/>
+              </a:rPr>
+              <a:t> </a:t>
+            </a:r>
+            <a:r>
+              <a:rPr lang="en-US" dirty="0" err="1">
+                <a:solidFill>
+                  <a:srgbClr val="000000"/>
+                </a:solidFill>
+                <a:latin typeface="Consolas" panose="020B0609020204030204" pitchFamily="49" charset="0"/>
+              </a:rPr>
+              <a:t>DoneAsync</a:t>
+            </a:r>
+            <a:r>
+              <a:rPr lang="en-US" dirty="0">
+                <a:solidFill>
+                  <a:srgbClr val="000000"/>
+                </a:solidFill>
+                <a:latin typeface="Consolas" panose="020B0609020204030204" pitchFamily="49" charset="0"/>
+              </a:rPr>
+              <a:t>(</a:t>
+            </a:r>
+            <a:r>
+              <a:rPr lang="en-US" dirty="0">
+                <a:solidFill>
+                  <a:srgbClr val="2B91AF"/>
+                </a:solidFill>
+                <a:latin typeface="Consolas" panose="020B0609020204030204" pitchFamily="49" charset="0"/>
+              </a:rPr>
+              <a:t>Item</a:t>
+            </a:r>
+            <a:r>
+              <a:rPr lang="en-US" dirty="0">
+                <a:solidFill>
+                  <a:srgbClr val="000000"/>
+                </a:solidFill>
+                <a:latin typeface="Consolas" panose="020B0609020204030204" pitchFamily="49" charset="0"/>
+              </a:rPr>
+              <a:t> </a:t>
+            </a:r>
+            <a:r>
+              <a:rPr lang="en-US" dirty="0" err="1">
+                <a:solidFill>
+                  <a:srgbClr val="000000"/>
+                </a:solidFill>
+                <a:latin typeface="Consolas" panose="020B0609020204030204" pitchFamily="49" charset="0"/>
+              </a:rPr>
+              <a:t>item</a:t>
+            </a:r>
+            <a:r>
+              <a:rPr lang="en-US" dirty="0">
+                <a:solidFill>
+                  <a:srgbClr val="000000"/>
+                </a:solidFill>
+                <a:latin typeface="Consolas" panose="020B0609020204030204" pitchFamily="49" charset="0"/>
+              </a:rPr>
+              <a:t>, </a:t>
+            </a:r>
+            <a:r>
+              <a:rPr lang="en-US" dirty="0">
+                <a:solidFill>
+                  <a:srgbClr val="0000FF"/>
+                </a:solidFill>
+                <a:latin typeface="Consolas" panose="020B0609020204030204" pitchFamily="49" charset="0"/>
+              </a:rPr>
+              <a:t>object</a:t>
+            </a:r>
+            <a:r>
+              <a:rPr lang="en-US" dirty="0">
+                <a:solidFill>
+                  <a:srgbClr val="000000"/>
+                </a:solidFill>
+                <a:latin typeface="Consolas" panose="020B0609020204030204" pitchFamily="49" charset="0"/>
+              </a:rPr>
+              <a:t> state, </a:t>
+            </a:r>
+            <a:r>
+              <a:rPr lang="en-US" dirty="0" err="1">
+                <a:solidFill>
+                  <a:srgbClr val="2B91AF"/>
+                </a:solidFill>
+                <a:latin typeface="Consolas" panose="020B0609020204030204" pitchFamily="49" charset="0"/>
+              </a:rPr>
+              <a:t>CancellationToken</a:t>
+            </a:r>
+            <a:r>
+              <a:rPr lang="en-US" dirty="0">
+                <a:solidFill>
+                  <a:srgbClr val="000000"/>
+                </a:solidFill>
+                <a:latin typeface="Consolas" panose="020B0609020204030204" pitchFamily="49" charset="0"/>
+              </a:rPr>
+              <a:t> token);</a:t>
+            </a:r>
+            <a:br>
+              <a:rPr lang="en-US" dirty="0">
+                <a:solidFill>
+                  <a:srgbClr val="000000"/>
+                </a:solidFill>
+                <a:latin typeface="Consolas" panose="020B0609020204030204" pitchFamily="49" charset="0"/>
+              </a:rPr>
+            </a:br>
+            <a:r>
+              <a:rPr lang="en-US" dirty="0">
+                <a:solidFill>
+                  <a:srgbClr val="000000"/>
+                </a:solidFill>
+                <a:latin typeface="Consolas" panose="020B0609020204030204" pitchFamily="49" charset="0"/>
+              </a:rPr>
+              <a:t>    }</a:t>
+            </a:r>
             <a:endParaRPr lang="en-US" dirty="0"/>
           </a:p>
         </p:txBody>
@@ -8721,7 +9513,7 @@
     </p:spTree>
     <p:extLst>
       <p:ext uri="{BB962C8B-B14F-4D97-AF65-F5344CB8AC3E}">
-        <p14:creationId xmlns:p14="http://schemas.microsoft.com/office/powerpoint/2010/main" val="2221766266"/>
+        <p14:creationId xmlns:p14="http://schemas.microsoft.com/office/powerpoint/2010/main" val="906255408"/>
       </p:ext>
     </p:extLst>
   </p:cSld>
@@ -8760,12 +9552,14 @@
         </p:nvSpPr>
         <p:spPr/>
         <p:txBody>
-          <a:bodyPr/>
+          <a:bodyPr>
+            <a:normAutofit/>
+          </a:bodyPr>
           <a:lstStyle/>
           <a:p>
             <a:r>
               <a:rPr lang="en-US" dirty="0"/>
-              <a:t>Azure Bot Service</a:t>
+              <a:t>Natural Language Processing (LUIS)</a:t>
             </a:r>
           </a:p>
         </p:txBody>
@@ -8782,61 +9576,105 @@
         </p:nvSpPr>
         <p:spPr/>
         <p:txBody>
-          <a:bodyPr/>
+          <a:bodyPr>
+            <a:normAutofit fontScale="92500" lnSpcReduction="20000"/>
+          </a:bodyPr>
           <a:lstStyle/>
           <a:p>
             <a:r>
               <a:rPr lang="en-US" dirty="0"/>
-              <a:t>Conversation as a Service/Platform (</a:t>
+              <a:t>Allows the user to type free-form text</a:t>
+            </a:r>
+          </a:p>
+          <a:p>
+            <a:r>
+              <a:rPr lang="en-US" dirty="0"/>
+              <a:t>Define Intents</a:t>
+            </a:r>
+          </a:p>
+          <a:p>
+            <a:pPr lvl="1"/>
+            <a:r>
+              <a:rPr lang="en-US" dirty="0"/>
+              <a:t>Map to dialog methods</a:t>
+            </a:r>
+          </a:p>
+          <a:p>
+            <a:r>
+              <a:rPr lang="en-US" dirty="0"/>
+              <a:t>Define Entities</a:t>
+            </a:r>
+          </a:p>
+          <a:p>
+            <a:pPr lvl="1"/>
+            <a:r>
+              <a:rPr lang="en-US" dirty="0"/>
+              <a:t>Data in the user’s text</a:t>
+            </a:r>
+          </a:p>
+          <a:p>
+            <a:r>
+              <a:rPr lang="en-US" dirty="0"/>
+              <a:t>Add Utterances</a:t>
+            </a:r>
+          </a:p>
+          <a:p>
+            <a:pPr lvl="1"/>
+            <a:r>
+              <a:rPr lang="en-US" dirty="0"/>
+              <a:t>Examples of questions that match intents and contain entities</a:t>
+            </a:r>
+          </a:p>
+          <a:p>
+            <a:r>
+              <a:rPr lang="en-US" dirty="0"/>
+              <a:t>Train and Publish</a:t>
+            </a:r>
+          </a:p>
+          <a:p>
+            <a:pPr lvl="1"/>
+            <a:r>
+              <a:rPr lang="en-US" dirty="0"/>
+              <a:t>Publishing gives keys for the chatbot</a:t>
+            </a:r>
+          </a:p>
+          <a:p>
+            <a:r>
+              <a:rPr lang="en-US" dirty="0"/>
+              <a:t>Add </a:t>
             </a:r>
             <a:r>
               <a:rPr lang="en-US" dirty="0" err="1"/>
-              <a:t>CaaS</a:t>
+              <a:t>LuisDialog</a:t>
             </a:r>
             <a:r>
               <a:rPr lang="en-US" dirty="0"/>
-              <a:t>/</a:t>
-            </a:r>
-            <a:r>
-              <a:rPr lang="en-US" dirty="0" err="1"/>
-              <a:t>CaaP</a:t>
-            </a:r>
+              <a:t> to chatbot code </a:t>
+            </a:r>
+          </a:p>
+          <a:p>
+            <a:pPr lvl="1"/>
             <a:r>
               <a:rPr lang="en-US" dirty="0"/>
-              <a:t>)</a:t>
-            </a:r>
-          </a:p>
-          <a:p>
+              <a:t>Attributes for Model and Intents</a:t>
+            </a:r>
+          </a:p>
+          <a:p>
+            <a:pPr lvl="1"/>
             <a:r>
               <a:rPr lang="en-US" dirty="0"/>
-              <a:t>Scalability</a:t>
-            </a:r>
-          </a:p>
-          <a:p>
-            <a:r>
-              <a:rPr lang="en-US" dirty="0"/>
-              <a:t>On-Line Editor and Tools</a:t>
-            </a:r>
-          </a:p>
-          <a:p>
-            <a:pPr lvl="1"/>
-            <a:r>
-              <a:rPr lang="en-US" dirty="0"/>
-              <a:t>Can work off-line too</a:t>
-            </a:r>
-          </a:p>
-          <a:p>
-            <a:r>
-              <a:rPr lang="en-US" dirty="0"/>
-              <a:t>Source Code Deployment</a:t>
-            </a:r>
+              <a:t>Logic to read entities to form response</a:t>
+            </a:r>
+          </a:p>
+          <a:p>
+            <a:endParaRPr lang="en-US" dirty="0"/>
           </a:p>
         </p:txBody>
       </p:sp>
     </p:spTree>
     <p:extLst>
       <p:ext uri="{BB962C8B-B14F-4D97-AF65-F5344CB8AC3E}">
-        <p14:creationId xmlns:p14="http://schemas.microsoft.com/office/powerpoint/2010/main" val="3348858979"/>
+        <p14:creationId xmlns:p14="http://schemas.microsoft.com/office/powerpoint/2010/main" val="2221766266"/>
       </p:ext>
     </p:extLst>
   </p:cSld>
@@ -8879,10 +9717,9 @@
           <a:lstStyle/>
           <a:p>
             <a:r>
-              <a:rPr lang="en-US" dirty="0" err="1"/>
-              <a:t>Botiquette</a:t>
-            </a:r>
-            <a:endParaRPr lang="en-US" dirty="0"/>
+              <a:rPr lang="en-US" dirty="0"/>
+              <a:t>Azure Bot Service</a:t>
+            </a:r>
           </a:p>
         </p:txBody>
       </p:sp>
@@ -8902,18 +9739,20 @@
           <a:lstStyle/>
           <a:p>
             <a:r>
+              <a:rPr lang="en-US" dirty="0"/>
+              <a:t>Conversation as a Service/Platform (</a:t>
+            </a:r>
+            <a:r>
               <a:rPr lang="en-US" dirty="0" err="1"/>
-              <a:t>Botiquette</a:t>
+              <a:t>CaaS</a:t>
             </a:r>
             <a:r>
               <a:rPr lang="en-US" dirty="0"/>
-              <a:t> (</a:t>
-            </a:r>
-            <a:r>
-              <a:rPr lang="en-US" dirty="0">
-                <a:hlinkClick r:id="rId2"/>
-              </a:rPr>
-              <a:t>http://bit.ly/1TWQ0Tp</a:t>
+              <a:t>/</a:t>
+            </a:r>
+            <a:r>
+              <a:rPr lang="en-US" dirty="0" err="1"/>
+              <a:t>CaaP</a:t>
             </a:r>
             <a:r>
               <a:rPr lang="en-US" dirty="0"/>
@@ -8921,42 +9760,28 @@
             </a:r>
           </a:p>
           <a:p>
+            <a:r>
+              <a:rPr lang="en-US" dirty="0"/>
+              <a:t>Scalability</a:t>
+            </a:r>
+          </a:p>
+          <a:p>
+            <a:r>
+              <a:rPr lang="en-US" dirty="0"/>
+              <a:t>On-Line Editor and Tools</a:t>
+            </a:r>
+          </a:p>
+          <a:p>
             <a:pPr lvl="1"/>
             <a:r>
-              <a:rPr lang="en-US" sz="1600" dirty="0"/>
-              <a:t>The customary code of polite behavior among bots and humans - often in social media, but also in apps, the enterprise, or any device where bot to bot and bot to human communication occur.</a:t>
-            </a:r>
-          </a:p>
-          <a:p>
-            <a:r>
               <a:rPr lang="en-US" dirty="0"/>
-              <a:t>Tay and You (social luring attack)</a:t>
+              <a:t>Can work off-line too</a:t>
             </a:r>
           </a:p>
           <a:p>
             <a:r>
               <a:rPr lang="en-US" dirty="0"/>
-              <a:t>Conversational Commerce (#</a:t>
-            </a:r>
-            <a:r>
-              <a:rPr lang="en-US" dirty="0" err="1"/>
-              <a:t>ConvComm</a:t>
-            </a:r>
-            <a:r>
-              <a:rPr lang="en-US" dirty="0"/>
-              <a:t>)</a:t>
-            </a:r>
-          </a:p>
-          <a:p>
-            <a:r>
-              <a:rPr lang="en-US" dirty="0"/>
-              <a:t>Bot or Not? (trying to act human)</a:t>
-            </a:r>
-          </a:p>
-          <a:p>
-            <a:r>
-              <a:rPr lang="en-US" dirty="0"/>
-              <a:t>Spam (notifications)</a:t>
+              <a:t>Source Code Deployment</a:t>
             </a:r>
           </a:p>
         </p:txBody>
@@ -8964,7 +9789,7 @@
     </p:spTree>
     <p:extLst>
       <p:ext uri="{BB962C8B-B14F-4D97-AF65-F5344CB8AC3E}">
-        <p14:creationId xmlns:p14="http://schemas.microsoft.com/office/powerpoint/2010/main" val="1811480033"/>
+        <p14:creationId xmlns:p14="http://schemas.microsoft.com/office/powerpoint/2010/main" val="3348858979"/>
       </p:ext>
     </p:extLst>
   </p:cSld>

</xml_diff>